<commit_message>
Newest change to the presentation
</commit_message>
<xml_diff>
--- a/Internship Presentation.pptx
+++ b/Internship Presentation.pptx
@@ -6804,7 +6804,7 @@
           <a:p>
             <a:fld id="{BF8DB953-018A-468F-A649-A8B3C5DAB22E}" type="datetimeFigureOut">
               <a:rPr lang="en-ID" smtClean="0"/>
-              <a:t>21/05/2019</a:t>
+              <a:t>22/05/2019</a:t>
             </a:fld>
             <a:endParaRPr lang="en-ID"/>
           </a:p>
@@ -7116,15 +7116,567 @@
           <a:bodyPr/>
           <a:lstStyle/>
           <a:p>
+            <a:pPr marL="171450" indent="-171450">
+              <a:buFontTx/>
+              <a:buChar char="-"/>
+            </a:pPr>
+            <a:r>
+              <a:rPr lang="en-US" dirty="0"/>
+              <a:t>Using the standard Library of </a:t>
+            </a:r>
+            <a:r>
+              <a:rPr lang="en-US" dirty="0" err="1"/>
+              <a:t>Aruco</a:t>
+            </a:r>
+            <a:r>
+              <a:rPr lang="en-US" dirty="0"/>
+              <a:t> Marker, which is available in the internet and already in ROS platform. And also implemented it with </a:t>
+            </a:r>
+            <a:r>
+              <a:rPr lang="en-US" dirty="0" err="1"/>
+              <a:t>realsense</a:t>
+            </a:r>
+            <a:r>
+              <a:rPr lang="en-US" dirty="0"/>
+              <a:t> camera, so I used the </a:t>
+            </a:r>
+            <a:r>
+              <a:rPr lang="en-US" dirty="0" err="1"/>
+              <a:t>realsense</a:t>
+            </a:r>
+            <a:r>
+              <a:rPr lang="en-US" dirty="0"/>
+              <a:t> wrapper for ROS.</a:t>
+            </a:r>
+          </a:p>
+          <a:p>
+            <a:pPr marL="171450" indent="-171450">
+              <a:buFontTx/>
+              <a:buChar char="-"/>
+            </a:pPr>
+            <a:r>
+              <a:rPr lang="en-US" dirty="0"/>
+              <a:t>So then I make from scratch a simple TF publisher code, which subscribe to a topic of fiducial transforms from the </a:t>
+            </a:r>
+            <a:r>
+              <a:rPr lang="en-US" dirty="0" err="1"/>
+              <a:t>aruco</a:t>
+            </a:r>
+            <a:r>
+              <a:rPr lang="en-US" dirty="0"/>
+              <a:t> detect code which consist of the position and also the orientation in 6DOF space. With that information then I publish the TF based on that information between the marker and also the camera</a:t>
+            </a:r>
+          </a:p>
+          <a:p>
+            <a:pPr marL="171450" indent="-171450">
+              <a:buFontTx/>
+              <a:buChar char="-"/>
+            </a:pPr>
+            <a:r>
+              <a:rPr lang="en-US" dirty="0"/>
+              <a:t>But then the requirement is not in 6DOF, the requirement is in 2DOF space, so then I need to transform the pose. And to do that, I listen to the TF between the marker pose and the </a:t>
+            </a:r>
+            <a:r>
+              <a:rPr lang="en-US" dirty="0" err="1"/>
+              <a:t>base_link</a:t>
+            </a:r>
+            <a:r>
+              <a:rPr lang="en-US" dirty="0"/>
+              <a:t>. And then take the value of x , y and yaw from that information. And make the z equals to 0 and also the roll and pitch.</a:t>
+            </a:r>
+            <a:endParaRPr lang="en-ID" dirty="0"/>
+          </a:p>
+        </p:txBody>
+      </p:sp>
+      <p:sp>
+        <p:nvSpPr>
+          <p:cNvPr id="4" name="Slide Number Placeholder 3"/>
+          <p:cNvSpPr>
+            <a:spLocks noGrp="1"/>
+          </p:cNvSpPr>
+          <p:nvPr>
+            <p:ph type="sldNum" sz="quarter" idx="5"/>
+          </p:nvPr>
+        </p:nvSpPr>
+        <p:spPr/>
+        <p:txBody>
+          <a:bodyPr/>
+          <a:lstStyle/>
+          <a:p>
+            <a:fld id="{67590C20-280B-46AC-B664-8ED8A31C37AD}" type="slidenum">
+              <a:rPr lang="en-ID" smtClean="0"/>
+              <a:t>4</a:t>
+            </a:fld>
+            <a:endParaRPr lang="en-ID"/>
+          </a:p>
+        </p:txBody>
+      </p:sp>
+    </p:spTree>
+    <p:extLst>
+      <p:ext uri="{BB962C8B-B14F-4D97-AF65-F5344CB8AC3E}">
+        <p14:creationId xmlns:p14="http://schemas.microsoft.com/office/powerpoint/2010/main" val="322706605"/>
+      </p:ext>
+    </p:extLst>
+  </p:cSld>
+  <p:clrMapOvr>
+    <a:masterClrMapping/>
+  </p:clrMapOvr>
+</p:notes>
+</file>
+
+<file path=ppt/notesSlides/notesSlide2.xml><?xml version="1.0" encoding="utf-8"?>
+<p:notes xmlns:a="http://schemas.openxmlformats.org/drawingml/2006/main" xmlns:r="http://schemas.openxmlformats.org/officeDocument/2006/relationships" xmlns:p="http://schemas.openxmlformats.org/presentationml/2006/main">
+  <p:cSld>
+    <p:spTree>
+      <p:nvGrpSpPr>
+        <p:cNvPr id="1" name=""/>
+        <p:cNvGrpSpPr/>
+        <p:nvPr/>
+      </p:nvGrpSpPr>
+      <p:grpSpPr>
+        <a:xfrm>
+          <a:off x="0" y="0"/>
+          <a:ext cx="0" cy="0"/>
+          <a:chOff x="0" y="0"/>
+          <a:chExt cx="0" cy="0"/>
+        </a:xfrm>
+      </p:grpSpPr>
+      <p:sp>
+        <p:nvSpPr>
+          <p:cNvPr id="2" name="Slide Image Placeholder 1"/>
+          <p:cNvSpPr>
+            <a:spLocks noGrp="1" noRot="1" noChangeAspect="1"/>
+          </p:cNvSpPr>
+          <p:nvPr>
+            <p:ph type="sldImg"/>
+          </p:nvPr>
+        </p:nvSpPr>
+        <p:spPr/>
+      </p:sp>
+      <p:sp>
+        <p:nvSpPr>
+          <p:cNvPr id="3" name="Notes Placeholder 2"/>
+          <p:cNvSpPr>
+            <a:spLocks noGrp="1"/>
+          </p:cNvSpPr>
+          <p:nvPr>
+            <p:ph type="body" idx="1"/>
+          </p:nvPr>
+        </p:nvSpPr>
+        <p:spPr/>
+        <p:txBody>
+          <a:bodyPr/>
+          <a:lstStyle/>
+          <a:p>
+            <a:pPr marL="171450" indent="-171450">
+              <a:buFontTx/>
+              <a:buChar char="-"/>
+            </a:pPr>
+            <a:r>
+              <a:rPr lang="en-US" dirty="0"/>
+              <a:t>There is already an existing docking code, </a:t>
+            </a:r>
+            <a:r>
+              <a:rPr lang="en-US" dirty="0" err="1"/>
+              <a:t>ipa</a:t>
+            </a:r>
+            <a:r>
+              <a:rPr lang="en-US" dirty="0"/>
+              <a:t> differential docking and cob docking. It is listening to a TF for the docking process. And then this code combine with the previous code to dock the robot. But then I need to modified a little bit, because the previous code docks in forward direction. But the requirement for </a:t>
+            </a:r>
+            <a:r>
+              <a:rPr lang="en-US" dirty="0" err="1"/>
+              <a:t>mobika</a:t>
+            </a:r>
+            <a:r>
+              <a:rPr lang="en-US" dirty="0"/>
+              <a:t> is to dock in backward direction for charging.</a:t>
+            </a:r>
+          </a:p>
+          <a:p>
+            <a:pPr marL="171450" indent="-171450">
+              <a:buFontTx/>
+              <a:buChar char="-"/>
+            </a:pPr>
+            <a:r>
+              <a:rPr lang="en-US" dirty="0"/>
+              <a:t>Then I combine this two code together, and I have tested and try to implemented it. First I tried the differential docking code in simulation to see if it’s working, and then implemented it in the </a:t>
+            </a:r>
+            <a:r>
+              <a:rPr lang="en-US" dirty="0" err="1"/>
+              <a:t>mobika</a:t>
+            </a:r>
+            <a:r>
+              <a:rPr lang="en-US" dirty="0"/>
+              <a:t> robot. And then I have couple videos of the result of </a:t>
+            </a:r>
+            <a:r>
+              <a:rPr lang="en-US"/>
+              <a:t>the docking.</a:t>
+            </a:r>
+            <a:endParaRPr lang="en-ID" dirty="0"/>
+          </a:p>
+        </p:txBody>
+      </p:sp>
+      <p:sp>
+        <p:nvSpPr>
+          <p:cNvPr id="4" name="Slide Number Placeholder 3"/>
+          <p:cNvSpPr>
+            <a:spLocks noGrp="1"/>
+          </p:cNvSpPr>
+          <p:nvPr>
+            <p:ph type="sldNum" sz="quarter" idx="5"/>
+          </p:nvPr>
+        </p:nvSpPr>
+        <p:spPr/>
+        <p:txBody>
+          <a:bodyPr/>
+          <a:lstStyle/>
+          <a:p>
+            <a:fld id="{67590C20-280B-46AC-B664-8ED8A31C37AD}" type="slidenum">
+              <a:rPr lang="en-ID" smtClean="0"/>
+              <a:t>5</a:t>
+            </a:fld>
+            <a:endParaRPr lang="en-ID"/>
+          </a:p>
+        </p:txBody>
+      </p:sp>
+    </p:spTree>
+    <p:extLst>
+      <p:ext uri="{BB962C8B-B14F-4D97-AF65-F5344CB8AC3E}">
+        <p14:creationId xmlns:p14="http://schemas.microsoft.com/office/powerpoint/2010/main" val="3168966596"/>
+      </p:ext>
+    </p:extLst>
+  </p:cSld>
+  <p:clrMapOvr>
+    <a:masterClrMapping/>
+  </p:clrMapOvr>
+</p:notes>
+</file>
+
+<file path=ppt/notesSlides/notesSlide3.xml><?xml version="1.0" encoding="utf-8"?>
+<p:notes xmlns:a="http://schemas.openxmlformats.org/drawingml/2006/main" xmlns:r="http://schemas.openxmlformats.org/officeDocument/2006/relationships" xmlns:p="http://schemas.openxmlformats.org/presentationml/2006/main">
+  <p:cSld>
+    <p:spTree>
+      <p:nvGrpSpPr>
+        <p:cNvPr id="1" name=""/>
+        <p:cNvGrpSpPr/>
+        <p:nvPr/>
+      </p:nvGrpSpPr>
+      <p:grpSpPr>
+        <a:xfrm>
+          <a:off x="0" y="0"/>
+          <a:ext cx="0" cy="0"/>
+          <a:chOff x="0" y="0"/>
+          <a:chExt cx="0" cy="0"/>
+        </a:xfrm>
+      </p:grpSpPr>
+      <p:sp>
+        <p:nvSpPr>
+          <p:cNvPr id="2" name="Slide Image Placeholder 1"/>
+          <p:cNvSpPr>
+            <a:spLocks noGrp="1" noRot="1" noChangeAspect="1"/>
+          </p:cNvSpPr>
+          <p:nvPr>
+            <p:ph type="sldImg"/>
+          </p:nvPr>
+        </p:nvSpPr>
+        <p:spPr/>
+      </p:sp>
+      <p:sp>
+        <p:nvSpPr>
+          <p:cNvPr id="3" name="Notes Placeholder 2"/>
+          <p:cNvSpPr>
+            <a:spLocks noGrp="1"/>
+          </p:cNvSpPr>
+          <p:nvPr>
+            <p:ph type="body" idx="1"/>
+          </p:nvPr>
+        </p:nvSpPr>
+        <p:spPr/>
+        <p:txBody>
+          <a:bodyPr/>
+          <a:lstStyle/>
+          <a:p>
+            <a:r>
+              <a:rPr lang="en-US" dirty="0"/>
+              <a:t>- Here are two videos of the result of the docking process.</a:t>
+            </a:r>
+            <a:endParaRPr lang="en-ID" dirty="0"/>
+          </a:p>
+        </p:txBody>
+      </p:sp>
+      <p:sp>
+        <p:nvSpPr>
+          <p:cNvPr id="4" name="Slide Number Placeholder 3"/>
+          <p:cNvSpPr>
+            <a:spLocks noGrp="1"/>
+          </p:cNvSpPr>
+          <p:nvPr>
+            <p:ph type="sldNum" sz="quarter" idx="5"/>
+          </p:nvPr>
+        </p:nvSpPr>
+        <p:spPr/>
+        <p:txBody>
+          <a:bodyPr/>
+          <a:lstStyle/>
+          <a:p>
+            <a:fld id="{67590C20-280B-46AC-B664-8ED8A31C37AD}" type="slidenum">
+              <a:rPr lang="en-ID" smtClean="0"/>
+              <a:t>6</a:t>
+            </a:fld>
+            <a:endParaRPr lang="en-ID"/>
+          </a:p>
+        </p:txBody>
+      </p:sp>
+    </p:spTree>
+    <p:extLst>
+      <p:ext uri="{BB962C8B-B14F-4D97-AF65-F5344CB8AC3E}">
+        <p14:creationId xmlns:p14="http://schemas.microsoft.com/office/powerpoint/2010/main" val="3514820537"/>
+      </p:ext>
+    </p:extLst>
+  </p:cSld>
+  <p:clrMapOvr>
+    <a:masterClrMapping/>
+  </p:clrMapOvr>
+</p:notes>
+</file>
+
+<file path=ppt/notesSlides/notesSlide4.xml><?xml version="1.0" encoding="utf-8"?>
+<p:notes xmlns:a="http://schemas.openxmlformats.org/drawingml/2006/main" xmlns:r="http://schemas.openxmlformats.org/officeDocument/2006/relationships" xmlns:p="http://schemas.openxmlformats.org/presentationml/2006/main">
+  <p:cSld>
+    <p:spTree>
+      <p:nvGrpSpPr>
+        <p:cNvPr id="1" name=""/>
+        <p:cNvGrpSpPr/>
+        <p:nvPr/>
+      </p:nvGrpSpPr>
+      <p:grpSpPr>
+        <a:xfrm>
+          <a:off x="0" y="0"/>
+          <a:ext cx="0" cy="0"/>
+          <a:chOff x="0" y="0"/>
+          <a:chExt cx="0" cy="0"/>
+        </a:xfrm>
+      </p:grpSpPr>
+      <p:sp>
+        <p:nvSpPr>
+          <p:cNvPr id="2" name="Slide Image Placeholder 1"/>
+          <p:cNvSpPr>
+            <a:spLocks noGrp="1" noRot="1" noChangeAspect="1"/>
+          </p:cNvSpPr>
+          <p:nvPr>
+            <p:ph type="sldImg"/>
+          </p:nvPr>
+        </p:nvSpPr>
+        <p:spPr/>
+      </p:sp>
+      <p:sp>
+        <p:nvSpPr>
+          <p:cNvPr id="3" name="Notes Placeholder 2"/>
+          <p:cNvSpPr>
+            <a:spLocks noGrp="1"/>
+          </p:cNvSpPr>
+          <p:nvPr>
+            <p:ph type="body" idx="1"/>
+          </p:nvPr>
+        </p:nvSpPr>
+        <p:spPr/>
+        <p:txBody>
+          <a:bodyPr/>
+          <a:lstStyle/>
+          <a:p>
+            <a:pPr marL="171450" indent="-171450">
+              <a:buFontTx/>
+              <a:buChar char="-"/>
+            </a:pPr>
+            <a:r>
+              <a:rPr lang="en-US" dirty="0"/>
+              <a:t>Here is the camera pose estimation, which use the feature in the robot, which is static. In this case the Lidar. While it is in circular shape, we can take advantage of Hough circle transformation to detect the Lidar. </a:t>
+            </a:r>
+          </a:p>
+          <a:p>
+            <a:pPr marL="171450" indent="-171450">
+              <a:buFontTx/>
+              <a:buChar char="-"/>
+            </a:pPr>
+            <a:r>
+              <a:rPr lang="en-US" dirty="0"/>
+              <a:t>So in this project I use the </a:t>
+            </a:r>
+            <a:r>
+              <a:rPr lang="en-US" dirty="0" err="1"/>
+              <a:t>hough</a:t>
+            </a:r>
+            <a:r>
+              <a:rPr lang="en-US" dirty="0"/>
+              <a:t> circle transformation, which is a standard library in </a:t>
+            </a:r>
+            <a:r>
+              <a:rPr lang="en-US" dirty="0" err="1"/>
+              <a:t>opencv</a:t>
+            </a:r>
+            <a:r>
+              <a:rPr lang="en-US" dirty="0"/>
+              <a:t> and use it to detect the circular shape of the Lidar.</a:t>
+            </a:r>
+          </a:p>
+          <a:p>
+            <a:pPr marL="171450" indent="-171450">
+              <a:buFontTx/>
+              <a:buChar char="-"/>
+            </a:pPr>
+            <a:endParaRPr lang="en-US" dirty="0"/>
+          </a:p>
+          <a:p>
+            <a:pPr marL="171450" indent="-171450">
+              <a:buFontTx/>
+              <a:buChar char="-"/>
+            </a:pPr>
+            <a:endParaRPr lang="en-US" dirty="0"/>
+          </a:p>
+          <a:p>
+            <a:pPr marL="171450" indent="-171450">
+              <a:buFontTx/>
+              <a:buChar char="-"/>
+            </a:pPr>
+            <a:r>
+              <a:rPr lang="en-US" dirty="0"/>
+              <a:t>And I am also using the camera FOV in this project as one of the tools to get the angle of the camera. And it will be later explained in the next slide.</a:t>
+            </a:r>
+          </a:p>
+          <a:p>
+            <a:pPr marL="171450" indent="-171450">
+              <a:buFontTx/>
+              <a:buChar char="-"/>
+            </a:pPr>
+            <a:r>
+              <a:rPr lang="en-US" dirty="0"/>
+              <a:t>Then I publish the TF of the camera pose, which use the angle detected from the previous process</a:t>
+            </a:r>
+            <a:endParaRPr lang="en-ID" dirty="0"/>
+          </a:p>
+          <a:p>
+            <a:pPr marL="171450" indent="-171450">
+              <a:buFontTx/>
+              <a:buChar char="-"/>
+            </a:pPr>
+            <a:r>
+              <a:rPr lang="en-US" dirty="0"/>
+              <a:t>I also create two mode for this project, which is the debugging mode, and non-debugging mode. The debugging mode is always calculating the pose or angle in a infinite loop, while the non debugging mode take 10 data and take the median as the final data, while it probably occurs some false position of the circle.</a:t>
+            </a:r>
+          </a:p>
+        </p:txBody>
+      </p:sp>
+      <p:sp>
+        <p:nvSpPr>
+          <p:cNvPr id="4" name="Slide Number Placeholder 3"/>
+          <p:cNvSpPr>
+            <a:spLocks noGrp="1"/>
+          </p:cNvSpPr>
+          <p:nvPr>
+            <p:ph type="sldNum" sz="quarter" idx="5"/>
+          </p:nvPr>
+        </p:nvSpPr>
+        <p:spPr/>
+        <p:txBody>
+          <a:bodyPr/>
+          <a:lstStyle/>
+          <a:p>
+            <a:fld id="{67590C20-280B-46AC-B664-8ED8A31C37AD}" type="slidenum">
+              <a:rPr lang="en-ID" smtClean="0"/>
+              <a:t>7</a:t>
+            </a:fld>
+            <a:endParaRPr lang="en-ID"/>
+          </a:p>
+        </p:txBody>
+      </p:sp>
+    </p:spTree>
+    <p:extLst>
+      <p:ext uri="{BB962C8B-B14F-4D97-AF65-F5344CB8AC3E}">
+        <p14:creationId xmlns:p14="http://schemas.microsoft.com/office/powerpoint/2010/main" val="254847161"/>
+      </p:ext>
+    </p:extLst>
+  </p:cSld>
+  <p:clrMapOvr>
+    <a:masterClrMapping/>
+  </p:clrMapOvr>
+</p:notes>
+</file>
+
+<file path=ppt/notesSlides/notesSlide5.xml><?xml version="1.0" encoding="utf-8"?>
+<p:notes xmlns:a="http://schemas.openxmlformats.org/drawingml/2006/main" xmlns:r="http://schemas.openxmlformats.org/officeDocument/2006/relationships" xmlns:p="http://schemas.openxmlformats.org/presentationml/2006/main">
+  <p:cSld>
+    <p:spTree>
+      <p:nvGrpSpPr>
+        <p:cNvPr id="1" name=""/>
+        <p:cNvGrpSpPr/>
+        <p:nvPr/>
+      </p:nvGrpSpPr>
+      <p:grpSpPr>
+        <a:xfrm>
+          <a:off x="0" y="0"/>
+          <a:ext cx="0" cy="0"/>
+          <a:chOff x="0" y="0"/>
+          <a:chExt cx="0" cy="0"/>
+        </a:xfrm>
+      </p:grpSpPr>
+      <p:sp>
+        <p:nvSpPr>
+          <p:cNvPr id="2" name="Slide Image Placeholder 1"/>
+          <p:cNvSpPr>
+            <a:spLocks noGrp="1" noRot="1" noChangeAspect="1"/>
+          </p:cNvSpPr>
+          <p:nvPr>
+            <p:ph type="sldImg"/>
+          </p:nvPr>
+        </p:nvSpPr>
+        <p:spPr/>
+      </p:sp>
+      <p:sp>
+        <p:nvSpPr>
+          <p:cNvPr id="3" name="Notes Placeholder 2"/>
+          <p:cNvSpPr>
+            <a:spLocks noGrp="1"/>
+          </p:cNvSpPr>
+          <p:nvPr>
+            <p:ph type="body" idx="1"/>
+          </p:nvPr>
+        </p:nvSpPr>
+        <p:spPr/>
+        <p:txBody>
+          <a:bodyPr/>
+          <a:lstStyle/>
+          <a:p>
             <a:r>
               <a:rPr lang="en-US" dirty="0"/>
               <a:t>Remember! </a:t>
             </a:r>
           </a:p>
           <a:p>
+            <a:pPr marL="171450" indent="-171450">
+              <a:buFontTx/>
+              <a:buChar char="-"/>
+            </a:pPr>
             <a:r>
               <a:rPr lang="en-US" dirty="0"/>
-              <a:t>- It calculated in 2D image, because the movement of the camera is restricted in one direction only. So the detected circle will always be in one line.</a:t>
+              <a:t>The reference colored in black, and when it is at the middle of the camera frame, the camera is at the angle which is straight / looks directly to the Lidar. So I used that as the reference frame.</a:t>
+            </a:r>
+          </a:p>
+          <a:p>
+            <a:pPr marL="171450" indent="-171450">
+              <a:buFontTx/>
+              <a:buChar char="-"/>
+            </a:pPr>
+            <a:r>
+              <a:rPr lang="en-US" dirty="0"/>
+              <a:t>What I want search or obtained is the b , but I calculated first the difference of the angle, which is theta. And then it can be easily obtained by this equation. And gradient equation is simply straight forward, which is the delta y divided by delta x.</a:t>
+            </a:r>
+          </a:p>
+          <a:p>
+            <a:r>
+              <a:rPr lang="en-US" dirty="0"/>
+              <a:t>- It calculated in 2D because the movement of the camera is restricted in one direction only. So the detected circle will always be in one line.</a:t>
             </a:r>
             <a:endParaRPr lang="en-ID" dirty="0"/>
           </a:p>
@@ -7354,7 +7906,7 @@
           <a:p>
             <a:fld id="{A57F7DC4-C586-48FF-BAEF-20E01F248707}" type="datetime1">
               <a:rPr lang="en-US" smtClean="0"/>
-              <a:t>5/21/2019</a:t>
+              <a:t>5/22/2019</a:t>
             </a:fld>
             <a:endParaRPr lang="en-US" dirty="0"/>
           </a:p>
@@ -7692,7 +8244,7 @@
           <a:p>
             <a:fld id="{6CE20742-A01E-4568-B513-4CBFFF04FF64}" type="datetime1">
               <a:rPr lang="en-US" smtClean="0"/>
-              <a:t>5/21/2019</a:t>
+              <a:t>5/22/2019</a:t>
             </a:fld>
             <a:endParaRPr lang="en-US" dirty="0"/>
           </a:p>
@@ -8093,7 +8645,7 @@
           <a:p>
             <a:fld id="{75FAFBA7-0396-4C74-9BAD-7EE60AC79094}" type="datetime1">
               <a:rPr lang="en-US" smtClean="0"/>
-              <a:t>5/21/2019</a:t>
+              <a:t>5/22/2019</a:t>
             </a:fld>
             <a:endParaRPr lang="en-US" dirty="0"/>
           </a:p>
@@ -8429,7 +8981,7 @@
           <a:p>
             <a:fld id="{4D72ADD5-A9EA-48C4-BDBB-681399332988}" type="datetime1">
               <a:rPr lang="en-US" smtClean="0"/>
-              <a:t>5/21/2019</a:t>
+              <a:t>5/22/2019</a:t>
             </a:fld>
             <a:endParaRPr lang="en-US" dirty="0"/>
           </a:p>
@@ -8749,7 +9301,7 @@
           <a:p>
             <a:fld id="{9ECC264B-16D8-4BE9-806E-83F9B699F54B}" type="datetime1">
               <a:rPr lang="en-US" smtClean="0"/>
-              <a:t>5/21/2019</a:t>
+              <a:t>5/22/2019</a:t>
             </a:fld>
             <a:endParaRPr lang="en-US" dirty="0"/>
           </a:p>
@@ -9145,7 +9697,7 @@
           <a:p>
             <a:fld id="{BC50F5D9-3677-4285-87A8-D61638B76689}" type="datetime1">
               <a:rPr lang="en-US" smtClean="0"/>
-              <a:t>5/21/2019</a:t>
+              <a:t>5/22/2019</a:t>
             </a:fld>
             <a:endParaRPr lang="en-US" dirty="0"/>
           </a:p>
@@ -9402,7 +9954,7 @@
           <a:p>
             <a:fld id="{CA5997AC-FB80-4911-A972-E9F026C3057B}" type="datetime1">
               <a:rPr lang="en-US" smtClean="0"/>
-              <a:t>5/21/2019</a:t>
+              <a:t>5/22/2019</a:t>
             </a:fld>
             <a:endParaRPr lang="en-US" dirty="0"/>
           </a:p>
@@ -9664,7 +10216,7 @@
           <a:p>
             <a:fld id="{FEAF0D9A-E76F-4A0F-967A-958DDB4BD9E9}" type="datetime1">
               <a:rPr lang="en-US" smtClean="0"/>
-              <a:t>5/21/2019</a:t>
+              <a:t>5/22/2019</a:t>
             </a:fld>
             <a:endParaRPr lang="en-US" dirty="0"/>
           </a:p>
@@ -9926,7 +10478,7 @@
           <a:p>
             <a:fld id="{43A026AB-CAD4-4520-8E32-15D2A225933A}" type="datetime1">
               <a:rPr lang="en-US" smtClean="0"/>
-              <a:t>5/21/2019</a:t>
+              <a:t>5/22/2019</a:t>
             </a:fld>
             <a:endParaRPr lang="en-US" dirty="0"/>
           </a:p>
@@ -10255,7 +10807,7 @@
           <a:p>
             <a:fld id="{BE6021C7-B06C-4422-8C75-225ED1AB4762}" type="datetime1">
               <a:rPr lang="en-US" smtClean="0"/>
-              <a:t>5/21/2019</a:t>
+              <a:t>5/22/2019</a:t>
             </a:fld>
             <a:endParaRPr lang="en-US" dirty="0"/>
           </a:p>
@@ -10578,7 +11130,7 @@
           <a:p>
             <a:fld id="{1F05539E-5C3E-4226-93B8-84CB41B23959}" type="datetime1">
               <a:rPr lang="en-US" smtClean="0"/>
-              <a:t>5/21/2019</a:t>
+              <a:t>5/22/2019</a:t>
             </a:fld>
             <a:endParaRPr lang="en-US" dirty="0"/>
           </a:p>
@@ -11035,7 +11587,7 @@
           <a:p>
             <a:fld id="{3ABF9E1F-A449-432C-8F70-236C1B1DCE0C}" type="datetime1">
               <a:rPr lang="en-US" smtClean="0"/>
-              <a:t>5/21/2019</a:t>
+              <a:t>5/22/2019</a:t>
             </a:fld>
             <a:endParaRPr lang="en-US" dirty="0"/>
           </a:p>
@@ -11240,7 +11792,7 @@
           <a:p>
             <a:fld id="{6F7F48D0-5591-482C-A6B4-7D9DDF653F5E}" type="datetime1">
               <a:rPr lang="en-US" smtClean="0"/>
-              <a:t>5/21/2019</a:t>
+              <a:t>5/22/2019</a:t>
             </a:fld>
             <a:endParaRPr lang="en-US" dirty="0"/>
           </a:p>
@@ -11417,7 +11969,7 @@
           <a:p>
             <a:fld id="{D20EC0FA-FE3F-4A28-B783-546618C912FB}" type="datetime1">
               <a:rPr lang="en-US" smtClean="0"/>
-              <a:t>5/21/2019</a:t>
+              <a:t>5/22/2019</a:t>
             </a:fld>
             <a:endParaRPr lang="en-US" dirty="0"/>
           </a:p>
@@ -11750,7 +12302,7 @@
           <a:p>
             <a:fld id="{46E7B388-9E84-4F19-BEC0-D207A126F0BB}" type="datetime1">
               <a:rPr lang="en-US" smtClean="0"/>
-              <a:t>5/21/2019</a:t>
+              <a:t>5/22/2019</a:t>
             </a:fld>
             <a:endParaRPr lang="en-US" dirty="0"/>
           </a:p>
@@ -12095,7 +12647,7 @@
           <a:p>
             <a:fld id="{90DE0490-AE58-4AB8-A777-CA7C3A33BE63}" type="datetime1">
               <a:rPr lang="en-US" smtClean="0"/>
-              <a:t>5/21/2019</a:t>
+              <a:t>5/22/2019</a:t>
             </a:fld>
             <a:endParaRPr lang="en-US" dirty="0"/>
           </a:p>
@@ -14212,7 +14764,7 @@
           <a:p>
             <a:fld id="{A798A687-774A-491A-84CB-20B8888AB425}" type="datetime1">
               <a:rPr lang="en-US" smtClean="0"/>
-              <a:t>5/21/2019</a:t>
+              <a:t>5/22/2019</a:t>
             </a:fld>
             <a:endParaRPr lang="en-US" dirty="0"/>
           </a:p>
@@ -17402,8 +17954,8 @@
           </a:p>
         </p:txBody>
       </p:sp>
-      <mc:AlternateContent xmlns:mc="http://schemas.openxmlformats.org/markup-compatibility/2006">
-        <mc:Choice xmlns:a14="http://schemas.microsoft.com/office/drawing/2010/main" Requires="a14">
+      <mc:AlternateContent xmlns:mc="http://schemas.openxmlformats.org/markup-compatibility/2006" xmlns:a14="http://schemas.microsoft.com/office/drawing/2010/main">
+        <mc:Choice Requires="a14">
           <p:sp>
             <p:nvSpPr>
               <p:cNvPr id="6" name="TextBox 5">
@@ -17754,7 +18306,7 @@
             </p:txBody>
           </p:sp>
         </mc:Choice>
-        <mc:Fallback>
+        <mc:Fallback xmlns="">
           <p:sp>
             <p:nvSpPr>
               <p:cNvPr id="6" name="TextBox 5">
@@ -17951,8 +18503,8 @@
           </a:p>
         </p:txBody>
       </p:sp>
-      <mc:AlternateContent xmlns:mc="http://schemas.openxmlformats.org/markup-compatibility/2006">
-        <mc:Choice xmlns:a14="http://schemas.microsoft.com/office/drawing/2010/main" Requires="a14">
+      <mc:AlternateContent xmlns:mc="http://schemas.openxmlformats.org/markup-compatibility/2006" xmlns:a14="http://schemas.microsoft.com/office/drawing/2010/main">
+        <mc:Choice Requires="a14">
           <p:sp>
             <p:nvSpPr>
               <p:cNvPr id="32" name="TextBox 31">
@@ -18340,7 +18892,7 @@
             </p:txBody>
           </p:sp>
         </mc:Choice>
-        <mc:Fallback>
+        <mc:Fallback xmlns="">
           <p:sp>
             <p:nvSpPr>
               <p:cNvPr id="32" name="TextBox 31">
@@ -18465,8 +19017,8 @@
           </a:fontRef>
         </p:style>
       </p:cxnSp>
-      <mc:AlternateContent xmlns:mc="http://schemas.openxmlformats.org/markup-compatibility/2006">
-        <mc:Choice xmlns:a14="http://schemas.microsoft.com/office/drawing/2010/main" Requires="a14">
+      <mc:AlternateContent xmlns:mc="http://schemas.openxmlformats.org/markup-compatibility/2006" xmlns:a14="http://schemas.microsoft.com/office/drawing/2010/main">
+        <mc:Choice Requires="a14">
           <p:sp>
             <p:nvSpPr>
               <p:cNvPr id="21" name="TextBox 20">
@@ -18550,7 +19102,7 @@
             </p:txBody>
           </p:sp>
         </mc:Choice>
-        <mc:Fallback>
+        <mc:Fallback xmlns="">
           <p:sp>
             <p:nvSpPr>
               <p:cNvPr id="21" name="TextBox 20">
@@ -18595,8 +19147,8 @@
           </p:sp>
         </mc:Fallback>
       </mc:AlternateContent>
-      <mc:AlternateContent xmlns:mc="http://schemas.openxmlformats.org/markup-compatibility/2006">
-        <mc:Choice xmlns:a14="http://schemas.microsoft.com/office/drawing/2010/main" Requires="a14">
+      <mc:AlternateContent xmlns:mc="http://schemas.openxmlformats.org/markup-compatibility/2006" xmlns:a14="http://schemas.microsoft.com/office/drawing/2010/main">
+        <mc:Choice Requires="a14">
           <p:sp>
             <p:nvSpPr>
               <p:cNvPr id="22" name="TextBox 21">
@@ -18625,6 +19177,7 @@
               </a:bodyPr>
               <a:lstStyle/>
               <a:p>
+                <a:pPr/>
                 <a14:m>
                   <m:oMathPara xmlns:m="http://schemas.openxmlformats.org/officeDocument/2006/math">
                     <m:oMathParaPr>
@@ -18680,7 +19233,7 @@
             </p:txBody>
           </p:sp>
         </mc:Choice>
-        <mc:Fallback>
+        <mc:Fallback xmlns="">
           <p:sp>
             <p:nvSpPr>
               <p:cNvPr id="22" name="TextBox 21">
@@ -19467,7 +20020,7 @@
             </a:r>
             <a:r>
               <a:rPr lang="en-ID" dirty="0">
-                <a:hlinkClick r:id="rId2"/>
+                <a:hlinkClick r:id="rId3"/>
               </a:rPr>
               <a:t>http://wiki.ros.org/aruco_detect</a:t>
             </a:r>
@@ -19491,11 +20044,11 @@
             </a:r>
             <a:r>
               <a:rPr lang="en-ID" dirty="0" err="1"/>
-              <a:t>fiducial_transform</a:t>
+              <a:t>fiducial_transforms</a:t>
             </a:r>
             <a:r>
               <a:rPr lang="en-ID" dirty="0"/>
-              <a:t> </a:t>
+              <a:t> (marker pose) </a:t>
             </a:r>
           </a:p>
           <a:p>
@@ -19524,7 +20077,7 @@
           <p:nvPr/>
         </p:nvPicPr>
         <p:blipFill>
-          <a:blip r:embed="rId3">
+          <a:blip r:embed="rId4">
             <a:extLst>
               <a:ext uri="{28A0092B-C50C-407E-A947-70E740481C1C}">
                 <a14:useLocalDpi xmlns:a14="http://schemas.microsoft.com/office/drawing/2010/main" val="0"/>
@@ -19570,7 +20123,7 @@
           <p:nvPr/>
         </p:nvPicPr>
         <p:blipFill>
-          <a:blip r:embed="rId4">
+          <a:blip r:embed="rId5">
             <a:extLst>
               <a:ext uri="{28A0092B-C50C-407E-A947-70E740481C1C}">
                 <a14:useLocalDpi xmlns:a14="http://schemas.microsoft.com/office/drawing/2010/main" val="0"/>
@@ -20461,12 +21014,57 @@
             </a:lvl9pPr>
           </a:lstStyle>
           <a:p>
+            <a:pPr marL="0" indent="0">
+              <a:buNone/>
+            </a:pPr>
+            <a:endParaRPr lang="en-US" dirty="0"/>
+          </a:p>
+          <a:p>
+            <a:endParaRPr lang="en-ID" dirty="0"/>
+          </a:p>
+        </p:txBody>
+      </p:sp>
+      <p:sp>
+        <p:nvSpPr>
+          <p:cNvPr id="13" name="Rectangle 12">
+            <a:extLst>
+              <a:ext uri="{FF2B5EF4-FFF2-40B4-BE49-F238E27FC236}">
+                <a16:creationId xmlns:a16="http://schemas.microsoft.com/office/drawing/2014/main" id="{F224A25C-D6C3-41DC-BE4C-D40CFF1B177C}"/>
+              </a:ext>
+            </a:extLst>
+          </p:cNvPr>
+          <p:cNvSpPr/>
+          <p:nvPr/>
+        </p:nvSpPr>
+        <p:spPr>
+          <a:xfrm>
+            <a:off x="7189486" y="4424664"/>
+            <a:ext cx="4932740" cy="1477328"/>
+          </a:xfrm>
+          <a:prstGeom prst="rect">
+            <a:avLst/>
+          </a:prstGeom>
+        </p:spPr>
+        <p:txBody>
+          <a:bodyPr wrap="square">
+            <a:spAutoFit/>
+          </a:bodyPr>
+          <a:lstStyle/>
+          <a:p>
+            <a:pPr marL="285750" indent="-285750">
+              <a:buFont typeface="Arial" panose="020B0604020202020204" pitchFamily="34" charset="0"/>
+              <a:buChar char="•"/>
+            </a:pPr>
             <a:r>
               <a:rPr lang="en-US" dirty="0"/>
               <a:t>Transform the 6DOF marker pose to 2DOF marker pose</a:t>
             </a:r>
           </a:p>
           <a:p>
+            <a:pPr marL="285750" indent="-285750">
+              <a:buFont typeface="Arial" panose="020B0604020202020204" pitchFamily="34" charset="0"/>
+              <a:buChar char="•"/>
+            </a:pPr>
             <a:r>
               <a:rPr lang="en-US" dirty="0"/>
               <a:t>How? Listen TF between 6DOF </a:t>
@@ -20488,15 +21086,6 @@
               <a:t> and take only value of x, y and yaw</a:t>
             </a:r>
           </a:p>
-          <a:p>
-            <a:pPr marL="0" indent="0">
-              <a:buNone/>
-            </a:pPr>
-            <a:endParaRPr lang="en-US" dirty="0"/>
-          </a:p>
-          <a:p>
-            <a:endParaRPr lang="en-ID" dirty="0"/>
-          </a:p>
         </p:txBody>
       </p:sp>
     </p:spTree>
@@ -20509,6 +21098,614 @@
   <p:clrMapOvr>
     <a:masterClrMapping/>
   </p:clrMapOvr>
+  <p:timing>
+    <p:tnLst>
+      <p:par>
+        <p:cTn id="1" dur="indefinite" restart="never" nodeType="tmRoot">
+          <p:childTnLst>
+            <p:seq concurrent="1" nextAc="seek">
+              <p:cTn id="2" dur="indefinite" nodeType="mainSeq">
+                <p:childTnLst>
+                  <p:par>
+                    <p:cTn id="3" fill="hold">
+                      <p:stCondLst>
+                        <p:cond delay="indefinite"/>
+                      </p:stCondLst>
+                      <p:childTnLst>
+                        <p:par>
+                          <p:cTn id="4" fill="hold">
+                            <p:stCondLst>
+                              <p:cond delay="0"/>
+                            </p:stCondLst>
+                            <p:childTnLst>
+                              <p:par>
+                                <p:cTn id="5" presetID="42" presetClass="entr" presetSubtype="0" fill="hold" grpId="0" nodeType="clickEffect">
+                                  <p:stCondLst>
+                                    <p:cond delay="0"/>
+                                  </p:stCondLst>
+                                  <p:childTnLst>
+                                    <p:set>
+                                      <p:cBhvr>
+                                        <p:cTn id="6" dur="1" fill="hold">
+                                          <p:stCondLst>
+                                            <p:cond delay="0"/>
+                                          </p:stCondLst>
+                                        </p:cTn>
+                                        <p:tgtEl>
+                                          <p:spTgt spid="3">
+                                            <p:txEl>
+                                              <p:pRg st="0" end="0"/>
+                                            </p:txEl>
+                                          </p:spTgt>
+                                        </p:tgtEl>
+                                        <p:attrNameLst>
+                                          <p:attrName>style.visibility</p:attrName>
+                                        </p:attrNameLst>
+                                      </p:cBhvr>
+                                      <p:to>
+                                        <p:strVal val="visible"/>
+                                      </p:to>
+                                    </p:set>
+                                    <p:animEffect transition="in" filter="fade">
+                                      <p:cBhvr>
+                                        <p:cTn id="7" dur="1000"/>
+                                        <p:tgtEl>
+                                          <p:spTgt spid="3">
+                                            <p:txEl>
+                                              <p:pRg st="0" end="0"/>
+                                            </p:txEl>
+                                          </p:spTgt>
+                                        </p:tgtEl>
+                                      </p:cBhvr>
+                                    </p:animEffect>
+                                    <p:anim calcmode="lin" valueType="num">
+                                      <p:cBhvr>
+                                        <p:cTn id="8" dur="1000" fill="hold"/>
+                                        <p:tgtEl>
+                                          <p:spTgt spid="3">
+                                            <p:txEl>
+                                              <p:pRg st="0" end="0"/>
+                                            </p:txEl>
+                                          </p:spTgt>
+                                        </p:tgtEl>
+                                        <p:attrNameLst>
+                                          <p:attrName>ppt_x</p:attrName>
+                                        </p:attrNameLst>
+                                      </p:cBhvr>
+                                      <p:tavLst>
+                                        <p:tav tm="0">
+                                          <p:val>
+                                            <p:strVal val="#ppt_x"/>
+                                          </p:val>
+                                        </p:tav>
+                                        <p:tav tm="100000">
+                                          <p:val>
+                                            <p:strVal val="#ppt_x"/>
+                                          </p:val>
+                                        </p:tav>
+                                      </p:tavLst>
+                                    </p:anim>
+                                    <p:anim calcmode="lin" valueType="num">
+                                      <p:cBhvr>
+                                        <p:cTn id="9" dur="1000" fill="hold"/>
+                                        <p:tgtEl>
+                                          <p:spTgt spid="3">
+                                            <p:txEl>
+                                              <p:pRg st="0" end="0"/>
+                                            </p:txEl>
+                                          </p:spTgt>
+                                        </p:tgtEl>
+                                        <p:attrNameLst>
+                                          <p:attrName>ppt_y</p:attrName>
+                                        </p:attrNameLst>
+                                      </p:cBhvr>
+                                      <p:tavLst>
+                                        <p:tav tm="0">
+                                          <p:val>
+                                            <p:strVal val="#ppt_y+.1"/>
+                                          </p:val>
+                                        </p:tav>
+                                        <p:tav tm="100000">
+                                          <p:val>
+                                            <p:strVal val="#ppt_y"/>
+                                          </p:val>
+                                        </p:tav>
+                                      </p:tavLst>
+                                    </p:anim>
+                                  </p:childTnLst>
+                                </p:cTn>
+                              </p:par>
+                            </p:childTnLst>
+                          </p:cTn>
+                        </p:par>
+                      </p:childTnLst>
+                    </p:cTn>
+                  </p:par>
+                  <p:par>
+                    <p:cTn id="10" fill="hold">
+                      <p:stCondLst>
+                        <p:cond delay="indefinite"/>
+                      </p:stCondLst>
+                      <p:childTnLst>
+                        <p:par>
+                          <p:cTn id="11" fill="hold">
+                            <p:stCondLst>
+                              <p:cond delay="0"/>
+                            </p:stCondLst>
+                            <p:childTnLst>
+                              <p:par>
+                                <p:cTn id="12" presetID="42" presetClass="entr" presetSubtype="0" fill="hold" grpId="0" nodeType="clickEffect">
+                                  <p:stCondLst>
+                                    <p:cond delay="0"/>
+                                  </p:stCondLst>
+                                  <p:childTnLst>
+                                    <p:set>
+                                      <p:cBhvr>
+                                        <p:cTn id="13" dur="1" fill="hold">
+                                          <p:stCondLst>
+                                            <p:cond delay="0"/>
+                                          </p:stCondLst>
+                                        </p:cTn>
+                                        <p:tgtEl>
+                                          <p:spTgt spid="3">
+                                            <p:txEl>
+                                              <p:pRg st="1" end="1"/>
+                                            </p:txEl>
+                                          </p:spTgt>
+                                        </p:tgtEl>
+                                        <p:attrNameLst>
+                                          <p:attrName>style.visibility</p:attrName>
+                                        </p:attrNameLst>
+                                      </p:cBhvr>
+                                      <p:to>
+                                        <p:strVal val="visible"/>
+                                      </p:to>
+                                    </p:set>
+                                    <p:animEffect transition="in" filter="fade">
+                                      <p:cBhvr>
+                                        <p:cTn id="14" dur="1000"/>
+                                        <p:tgtEl>
+                                          <p:spTgt spid="3">
+                                            <p:txEl>
+                                              <p:pRg st="1" end="1"/>
+                                            </p:txEl>
+                                          </p:spTgt>
+                                        </p:tgtEl>
+                                      </p:cBhvr>
+                                    </p:animEffect>
+                                    <p:anim calcmode="lin" valueType="num">
+                                      <p:cBhvr>
+                                        <p:cTn id="15" dur="1000" fill="hold"/>
+                                        <p:tgtEl>
+                                          <p:spTgt spid="3">
+                                            <p:txEl>
+                                              <p:pRg st="1" end="1"/>
+                                            </p:txEl>
+                                          </p:spTgt>
+                                        </p:tgtEl>
+                                        <p:attrNameLst>
+                                          <p:attrName>ppt_x</p:attrName>
+                                        </p:attrNameLst>
+                                      </p:cBhvr>
+                                      <p:tavLst>
+                                        <p:tav tm="0">
+                                          <p:val>
+                                            <p:strVal val="#ppt_x"/>
+                                          </p:val>
+                                        </p:tav>
+                                        <p:tav tm="100000">
+                                          <p:val>
+                                            <p:strVal val="#ppt_x"/>
+                                          </p:val>
+                                        </p:tav>
+                                      </p:tavLst>
+                                    </p:anim>
+                                    <p:anim calcmode="lin" valueType="num">
+                                      <p:cBhvr>
+                                        <p:cTn id="16" dur="1000" fill="hold"/>
+                                        <p:tgtEl>
+                                          <p:spTgt spid="3">
+                                            <p:txEl>
+                                              <p:pRg st="1" end="1"/>
+                                            </p:txEl>
+                                          </p:spTgt>
+                                        </p:tgtEl>
+                                        <p:attrNameLst>
+                                          <p:attrName>ppt_y</p:attrName>
+                                        </p:attrNameLst>
+                                      </p:cBhvr>
+                                      <p:tavLst>
+                                        <p:tav tm="0">
+                                          <p:val>
+                                            <p:strVal val="#ppt_y+.1"/>
+                                          </p:val>
+                                        </p:tav>
+                                        <p:tav tm="100000">
+                                          <p:val>
+                                            <p:strVal val="#ppt_y"/>
+                                          </p:val>
+                                        </p:tav>
+                                      </p:tavLst>
+                                    </p:anim>
+                                  </p:childTnLst>
+                                </p:cTn>
+                              </p:par>
+                            </p:childTnLst>
+                          </p:cTn>
+                        </p:par>
+                      </p:childTnLst>
+                    </p:cTn>
+                  </p:par>
+                  <p:par>
+                    <p:cTn id="17" fill="hold">
+                      <p:stCondLst>
+                        <p:cond delay="indefinite"/>
+                      </p:stCondLst>
+                      <p:childTnLst>
+                        <p:par>
+                          <p:cTn id="18" fill="hold">
+                            <p:stCondLst>
+                              <p:cond delay="0"/>
+                            </p:stCondLst>
+                            <p:childTnLst>
+                              <p:par>
+                                <p:cTn id="19" presetID="42" presetClass="entr" presetSubtype="0" fill="hold" grpId="0" nodeType="clickEffect">
+                                  <p:stCondLst>
+                                    <p:cond delay="0"/>
+                                  </p:stCondLst>
+                                  <p:childTnLst>
+                                    <p:set>
+                                      <p:cBhvr>
+                                        <p:cTn id="20" dur="1" fill="hold">
+                                          <p:stCondLst>
+                                            <p:cond delay="0"/>
+                                          </p:stCondLst>
+                                        </p:cTn>
+                                        <p:tgtEl>
+                                          <p:spTgt spid="3">
+                                            <p:txEl>
+                                              <p:pRg st="2" end="2"/>
+                                            </p:txEl>
+                                          </p:spTgt>
+                                        </p:tgtEl>
+                                        <p:attrNameLst>
+                                          <p:attrName>style.visibility</p:attrName>
+                                        </p:attrNameLst>
+                                      </p:cBhvr>
+                                      <p:to>
+                                        <p:strVal val="visible"/>
+                                      </p:to>
+                                    </p:set>
+                                    <p:animEffect transition="in" filter="fade">
+                                      <p:cBhvr>
+                                        <p:cTn id="21" dur="1000"/>
+                                        <p:tgtEl>
+                                          <p:spTgt spid="3">
+                                            <p:txEl>
+                                              <p:pRg st="2" end="2"/>
+                                            </p:txEl>
+                                          </p:spTgt>
+                                        </p:tgtEl>
+                                      </p:cBhvr>
+                                    </p:animEffect>
+                                    <p:anim calcmode="lin" valueType="num">
+                                      <p:cBhvr>
+                                        <p:cTn id="22" dur="1000" fill="hold"/>
+                                        <p:tgtEl>
+                                          <p:spTgt spid="3">
+                                            <p:txEl>
+                                              <p:pRg st="2" end="2"/>
+                                            </p:txEl>
+                                          </p:spTgt>
+                                        </p:tgtEl>
+                                        <p:attrNameLst>
+                                          <p:attrName>ppt_x</p:attrName>
+                                        </p:attrNameLst>
+                                      </p:cBhvr>
+                                      <p:tavLst>
+                                        <p:tav tm="0">
+                                          <p:val>
+                                            <p:strVal val="#ppt_x"/>
+                                          </p:val>
+                                        </p:tav>
+                                        <p:tav tm="100000">
+                                          <p:val>
+                                            <p:strVal val="#ppt_x"/>
+                                          </p:val>
+                                        </p:tav>
+                                      </p:tavLst>
+                                    </p:anim>
+                                    <p:anim calcmode="lin" valueType="num">
+                                      <p:cBhvr>
+                                        <p:cTn id="23" dur="1000" fill="hold"/>
+                                        <p:tgtEl>
+                                          <p:spTgt spid="3">
+                                            <p:txEl>
+                                              <p:pRg st="2" end="2"/>
+                                            </p:txEl>
+                                          </p:spTgt>
+                                        </p:tgtEl>
+                                        <p:attrNameLst>
+                                          <p:attrName>ppt_y</p:attrName>
+                                        </p:attrNameLst>
+                                      </p:cBhvr>
+                                      <p:tavLst>
+                                        <p:tav tm="0">
+                                          <p:val>
+                                            <p:strVal val="#ppt_y+.1"/>
+                                          </p:val>
+                                        </p:tav>
+                                        <p:tav tm="100000">
+                                          <p:val>
+                                            <p:strVal val="#ppt_y"/>
+                                          </p:val>
+                                        </p:tav>
+                                      </p:tavLst>
+                                    </p:anim>
+                                  </p:childTnLst>
+                                </p:cTn>
+                              </p:par>
+                            </p:childTnLst>
+                          </p:cTn>
+                        </p:par>
+                      </p:childTnLst>
+                    </p:cTn>
+                  </p:par>
+                  <p:par>
+                    <p:cTn id="24" fill="hold">
+                      <p:stCondLst>
+                        <p:cond delay="indefinite"/>
+                      </p:stCondLst>
+                      <p:childTnLst>
+                        <p:par>
+                          <p:cTn id="25" fill="hold">
+                            <p:stCondLst>
+                              <p:cond delay="0"/>
+                            </p:stCondLst>
+                            <p:childTnLst>
+                              <p:par>
+                                <p:cTn id="26" presetID="42" presetClass="entr" presetSubtype="0" fill="hold" nodeType="clickEffect">
+                                  <p:stCondLst>
+                                    <p:cond delay="0"/>
+                                  </p:stCondLst>
+                                  <p:childTnLst>
+                                    <p:set>
+                                      <p:cBhvr>
+                                        <p:cTn id="27" dur="1" fill="hold">
+                                          <p:stCondLst>
+                                            <p:cond delay="0"/>
+                                          </p:stCondLst>
+                                        </p:cTn>
+                                        <p:tgtEl>
+                                          <p:spTgt spid="13">
+                                            <p:txEl>
+                                              <p:pRg st="0" end="0"/>
+                                            </p:txEl>
+                                          </p:spTgt>
+                                        </p:tgtEl>
+                                        <p:attrNameLst>
+                                          <p:attrName>style.visibility</p:attrName>
+                                        </p:attrNameLst>
+                                      </p:cBhvr>
+                                      <p:to>
+                                        <p:strVal val="visible"/>
+                                      </p:to>
+                                    </p:set>
+                                    <p:animEffect transition="in" filter="fade">
+                                      <p:cBhvr>
+                                        <p:cTn id="28" dur="1000"/>
+                                        <p:tgtEl>
+                                          <p:spTgt spid="13">
+                                            <p:txEl>
+                                              <p:pRg st="0" end="0"/>
+                                            </p:txEl>
+                                          </p:spTgt>
+                                        </p:tgtEl>
+                                      </p:cBhvr>
+                                    </p:animEffect>
+                                    <p:anim calcmode="lin" valueType="num">
+                                      <p:cBhvr>
+                                        <p:cTn id="29" dur="1000" fill="hold"/>
+                                        <p:tgtEl>
+                                          <p:spTgt spid="13">
+                                            <p:txEl>
+                                              <p:pRg st="0" end="0"/>
+                                            </p:txEl>
+                                          </p:spTgt>
+                                        </p:tgtEl>
+                                        <p:attrNameLst>
+                                          <p:attrName>ppt_x</p:attrName>
+                                        </p:attrNameLst>
+                                      </p:cBhvr>
+                                      <p:tavLst>
+                                        <p:tav tm="0">
+                                          <p:val>
+                                            <p:strVal val="#ppt_x"/>
+                                          </p:val>
+                                        </p:tav>
+                                        <p:tav tm="100000">
+                                          <p:val>
+                                            <p:strVal val="#ppt_x"/>
+                                          </p:val>
+                                        </p:tav>
+                                      </p:tavLst>
+                                    </p:anim>
+                                    <p:anim calcmode="lin" valueType="num">
+                                      <p:cBhvr>
+                                        <p:cTn id="30" dur="1000" fill="hold"/>
+                                        <p:tgtEl>
+                                          <p:spTgt spid="13">
+                                            <p:txEl>
+                                              <p:pRg st="0" end="0"/>
+                                            </p:txEl>
+                                          </p:spTgt>
+                                        </p:tgtEl>
+                                        <p:attrNameLst>
+                                          <p:attrName>ppt_y</p:attrName>
+                                        </p:attrNameLst>
+                                      </p:cBhvr>
+                                      <p:tavLst>
+                                        <p:tav tm="0">
+                                          <p:val>
+                                            <p:strVal val="#ppt_y+.1"/>
+                                          </p:val>
+                                        </p:tav>
+                                        <p:tav tm="100000">
+                                          <p:val>
+                                            <p:strVal val="#ppt_y"/>
+                                          </p:val>
+                                        </p:tav>
+                                      </p:tavLst>
+                                    </p:anim>
+                                  </p:childTnLst>
+                                </p:cTn>
+                              </p:par>
+                            </p:childTnLst>
+                          </p:cTn>
+                        </p:par>
+                      </p:childTnLst>
+                    </p:cTn>
+                  </p:par>
+                  <p:par>
+                    <p:cTn id="31" fill="hold">
+                      <p:stCondLst>
+                        <p:cond delay="indefinite"/>
+                      </p:stCondLst>
+                      <p:childTnLst>
+                        <p:par>
+                          <p:cTn id="32" fill="hold">
+                            <p:stCondLst>
+                              <p:cond delay="0"/>
+                            </p:stCondLst>
+                            <p:childTnLst>
+                              <p:par>
+                                <p:cTn id="33" presetID="42" presetClass="entr" presetSubtype="0" fill="hold" nodeType="clickEffect">
+                                  <p:stCondLst>
+                                    <p:cond delay="0"/>
+                                  </p:stCondLst>
+                                  <p:childTnLst>
+                                    <p:set>
+                                      <p:cBhvr>
+                                        <p:cTn id="34" dur="1" fill="hold">
+                                          <p:stCondLst>
+                                            <p:cond delay="0"/>
+                                          </p:stCondLst>
+                                        </p:cTn>
+                                        <p:tgtEl>
+                                          <p:spTgt spid="13">
+                                            <p:txEl>
+                                              <p:pRg st="1" end="1"/>
+                                            </p:txEl>
+                                          </p:spTgt>
+                                        </p:tgtEl>
+                                        <p:attrNameLst>
+                                          <p:attrName>style.visibility</p:attrName>
+                                        </p:attrNameLst>
+                                      </p:cBhvr>
+                                      <p:to>
+                                        <p:strVal val="visible"/>
+                                      </p:to>
+                                    </p:set>
+                                    <p:animEffect transition="in" filter="fade">
+                                      <p:cBhvr>
+                                        <p:cTn id="35" dur="1000"/>
+                                        <p:tgtEl>
+                                          <p:spTgt spid="13">
+                                            <p:txEl>
+                                              <p:pRg st="1" end="1"/>
+                                            </p:txEl>
+                                          </p:spTgt>
+                                        </p:tgtEl>
+                                      </p:cBhvr>
+                                    </p:animEffect>
+                                    <p:anim calcmode="lin" valueType="num">
+                                      <p:cBhvr>
+                                        <p:cTn id="36" dur="1000" fill="hold"/>
+                                        <p:tgtEl>
+                                          <p:spTgt spid="13">
+                                            <p:txEl>
+                                              <p:pRg st="1" end="1"/>
+                                            </p:txEl>
+                                          </p:spTgt>
+                                        </p:tgtEl>
+                                        <p:attrNameLst>
+                                          <p:attrName>ppt_x</p:attrName>
+                                        </p:attrNameLst>
+                                      </p:cBhvr>
+                                      <p:tavLst>
+                                        <p:tav tm="0">
+                                          <p:val>
+                                            <p:strVal val="#ppt_x"/>
+                                          </p:val>
+                                        </p:tav>
+                                        <p:tav tm="100000">
+                                          <p:val>
+                                            <p:strVal val="#ppt_x"/>
+                                          </p:val>
+                                        </p:tav>
+                                      </p:tavLst>
+                                    </p:anim>
+                                    <p:anim calcmode="lin" valueType="num">
+                                      <p:cBhvr>
+                                        <p:cTn id="37" dur="1000" fill="hold"/>
+                                        <p:tgtEl>
+                                          <p:spTgt spid="13">
+                                            <p:txEl>
+                                              <p:pRg st="1" end="1"/>
+                                            </p:txEl>
+                                          </p:spTgt>
+                                        </p:tgtEl>
+                                        <p:attrNameLst>
+                                          <p:attrName>ppt_y</p:attrName>
+                                        </p:attrNameLst>
+                                      </p:cBhvr>
+                                      <p:tavLst>
+                                        <p:tav tm="0">
+                                          <p:val>
+                                            <p:strVal val="#ppt_y+.1"/>
+                                          </p:val>
+                                        </p:tav>
+                                        <p:tav tm="100000">
+                                          <p:val>
+                                            <p:strVal val="#ppt_y"/>
+                                          </p:val>
+                                        </p:tav>
+                                      </p:tavLst>
+                                    </p:anim>
+                                  </p:childTnLst>
+                                </p:cTn>
+                              </p:par>
+                            </p:childTnLst>
+                          </p:cTn>
+                        </p:par>
+                      </p:childTnLst>
+                    </p:cTn>
+                  </p:par>
+                </p:childTnLst>
+              </p:cTn>
+              <p:prevCondLst>
+                <p:cond evt="onPrev" delay="0">
+                  <p:tgtEl>
+                    <p:sldTgt/>
+                  </p:tgtEl>
+                </p:cond>
+              </p:prevCondLst>
+              <p:nextCondLst>
+                <p:cond evt="onNext" delay="0">
+                  <p:tgtEl>
+                    <p:sldTgt/>
+                  </p:tgtEl>
+                </p:cond>
+              </p:nextCondLst>
+            </p:seq>
+          </p:childTnLst>
+        </p:cTn>
+      </p:par>
+    </p:tnLst>
+    <p:bldLst>
+      <p:bldP spid="3" grpId="0" build="p"/>
+    </p:bldLst>
+  </p:timing>
 </p:sld>
 </file>
 
@@ -20886,7 +22083,7 @@
           <p:nvPr/>
         </p:nvPicPr>
         <p:blipFill>
-          <a:blip r:embed="rId2">
+          <a:blip r:embed="rId3">
             <a:extLst>
               <a:ext uri="{28A0092B-C50C-407E-A947-70E740481C1C}">
                 <a14:useLocalDpi xmlns:a14="http://schemas.microsoft.com/office/drawing/2010/main" val="0"/>
@@ -21236,6 +22433,266 @@
   <p:clrMapOvr>
     <a:masterClrMapping/>
   </p:clrMapOvr>
+  <p:timing>
+    <p:tnLst>
+      <p:par>
+        <p:cTn id="1" dur="indefinite" restart="never" nodeType="tmRoot">
+          <p:childTnLst>
+            <p:seq concurrent="1" nextAc="seek">
+              <p:cTn id="2" dur="indefinite" nodeType="mainSeq">
+                <p:childTnLst>
+                  <p:par>
+                    <p:cTn id="3" fill="hold">
+                      <p:stCondLst>
+                        <p:cond delay="indefinite"/>
+                      </p:stCondLst>
+                      <p:childTnLst>
+                        <p:par>
+                          <p:cTn id="4" fill="hold">
+                            <p:stCondLst>
+                              <p:cond delay="0"/>
+                            </p:stCondLst>
+                            <p:childTnLst>
+                              <p:par>
+                                <p:cTn id="5" presetID="42" presetClass="entr" presetSubtype="0" fill="hold" nodeType="clickEffect">
+                                  <p:stCondLst>
+                                    <p:cond delay="0"/>
+                                  </p:stCondLst>
+                                  <p:childTnLst>
+                                    <p:set>
+                                      <p:cBhvr>
+                                        <p:cTn id="6" dur="1" fill="hold">
+                                          <p:stCondLst>
+                                            <p:cond delay="0"/>
+                                          </p:stCondLst>
+                                        </p:cTn>
+                                        <p:tgtEl>
+                                          <p:spTgt spid="1035">
+                                            <p:txEl>
+                                              <p:pRg st="0" end="0"/>
+                                            </p:txEl>
+                                          </p:spTgt>
+                                        </p:tgtEl>
+                                        <p:attrNameLst>
+                                          <p:attrName>style.visibility</p:attrName>
+                                        </p:attrNameLst>
+                                      </p:cBhvr>
+                                      <p:to>
+                                        <p:strVal val="visible"/>
+                                      </p:to>
+                                    </p:set>
+                                    <p:animEffect transition="in" filter="fade">
+                                      <p:cBhvr>
+                                        <p:cTn id="7" dur="1000"/>
+                                        <p:tgtEl>
+                                          <p:spTgt spid="1035">
+                                            <p:txEl>
+                                              <p:pRg st="0" end="0"/>
+                                            </p:txEl>
+                                          </p:spTgt>
+                                        </p:tgtEl>
+                                      </p:cBhvr>
+                                    </p:animEffect>
+                                    <p:anim calcmode="lin" valueType="num">
+                                      <p:cBhvr>
+                                        <p:cTn id="8" dur="1000" fill="hold"/>
+                                        <p:tgtEl>
+                                          <p:spTgt spid="1035">
+                                            <p:txEl>
+                                              <p:pRg st="0" end="0"/>
+                                            </p:txEl>
+                                          </p:spTgt>
+                                        </p:tgtEl>
+                                        <p:attrNameLst>
+                                          <p:attrName>ppt_x</p:attrName>
+                                        </p:attrNameLst>
+                                      </p:cBhvr>
+                                      <p:tavLst>
+                                        <p:tav tm="0">
+                                          <p:val>
+                                            <p:strVal val="#ppt_x"/>
+                                          </p:val>
+                                        </p:tav>
+                                        <p:tav tm="100000">
+                                          <p:val>
+                                            <p:strVal val="#ppt_x"/>
+                                          </p:val>
+                                        </p:tav>
+                                      </p:tavLst>
+                                    </p:anim>
+                                    <p:anim calcmode="lin" valueType="num">
+                                      <p:cBhvr>
+                                        <p:cTn id="9" dur="1000" fill="hold"/>
+                                        <p:tgtEl>
+                                          <p:spTgt spid="1035">
+                                            <p:txEl>
+                                              <p:pRg st="0" end="0"/>
+                                            </p:txEl>
+                                          </p:spTgt>
+                                        </p:tgtEl>
+                                        <p:attrNameLst>
+                                          <p:attrName>ppt_y</p:attrName>
+                                        </p:attrNameLst>
+                                      </p:cBhvr>
+                                      <p:tavLst>
+                                        <p:tav tm="0">
+                                          <p:val>
+                                            <p:strVal val="#ppt_y+.1"/>
+                                          </p:val>
+                                        </p:tav>
+                                        <p:tav tm="100000">
+                                          <p:val>
+                                            <p:strVal val="#ppt_y"/>
+                                          </p:val>
+                                        </p:tav>
+                                      </p:tavLst>
+                                    </p:anim>
+                                  </p:childTnLst>
+                                </p:cTn>
+                              </p:par>
+                            </p:childTnLst>
+                          </p:cTn>
+                        </p:par>
+                      </p:childTnLst>
+                    </p:cTn>
+                  </p:par>
+                  <p:par>
+                    <p:cTn id="10" fill="hold">
+                      <p:stCondLst>
+                        <p:cond delay="indefinite"/>
+                      </p:stCondLst>
+                      <p:childTnLst>
+                        <p:par>
+                          <p:cTn id="11" fill="hold">
+                            <p:stCondLst>
+                              <p:cond delay="0"/>
+                            </p:stCondLst>
+                            <p:childTnLst>
+                              <p:par>
+                                <p:cTn id="12" presetID="42" presetClass="entr" presetSubtype="0" fill="hold" nodeType="clickEffect">
+                                  <p:stCondLst>
+                                    <p:cond delay="0"/>
+                                  </p:stCondLst>
+                                  <p:childTnLst>
+                                    <p:set>
+                                      <p:cBhvr>
+                                        <p:cTn id="13" dur="1" fill="hold">
+                                          <p:stCondLst>
+                                            <p:cond delay="0"/>
+                                          </p:stCondLst>
+                                        </p:cTn>
+                                        <p:tgtEl>
+                                          <p:spTgt spid="1035">
+                                            <p:txEl>
+                                              <p:pRg st="1" end="1"/>
+                                            </p:txEl>
+                                          </p:spTgt>
+                                        </p:tgtEl>
+                                        <p:attrNameLst>
+                                          <p:attrName>style.visibility</p:attrName>
+                                        </p:attrNameLst>
+                                      </p:cBhvr>
+                                      <p:to>
+                                        <p:strVal val="visible"/>
+                                      </p:to>
+                                    </p:set>
+                                    <p:animEffect transition="in" filter="fade">
+                                      <p:cBhvr>
+                                        <p:cTn id="14" dur="1000"/>
+                                        <p:tgtEl>
+                                          <p:spTgt spid="1035">
+                                            <p:txEl>
+                                              <p:pRg st="1" end="1"/>
+                                            </p:txEl>
+                                          </p:spTgt>
+                                        </p:tgtEl>
+                                      </p:cBhvr>
+                                    </p:animEffect>
+                                    <p:anim calcmode="lin" valueType="num">
+                                      <p:cBhvr>
+                                        <p:cTn id="15" dur="1000" fill="hold"/>
+                                        <p:tgtEl>
+                                          <p:spTgt spid="1035">
+                                            <p:txEl>
+                                              <p:pRg st="1" end="1"/>
+                                            </p:txEl>
+                                          </p:spTgt>
+                                        </p:tgtEl>
+                                        <p:attrNameLst>
+                                          <p:attrName>ppt_x</p:attrName>
+                                        </p:attrNameLst>
+                                      </p:cBhvr>
+                                      <p:tavLst>
+                                        <p:tav tm="0">
+                                          <p:val>
+                                            <p:strVal val="#ppt_x"/>
+                                          </p:val>
+                                        </p:tav>
+                                        <p:tav tm="100000">
+                                          <p:val>
+                                            <p:strVal val="#ppt_x"/>
+                                          </p:val>
+                                        </p:tav>
+                                      </p:tavLst>
+                                    </p:anim>
+                                    <p:anim calcmode="lin" valueType="num">
+                                      <p:cBhvr>
+                                        <p:cTn id="16" dur="1000" fill="hold"/>
+                                        <p:tgtEl>
+                                          <p:spTgt spid="1035">
+                                            <p:txEl>
+                                              <p:pRg st="1" end="1"/>
+                                            </p:txEl>
+                                          </p:spTgt>
+                                        </p:tgtEl>
+                                        <p:attrNameLst>
+                                          <p:attrName>ppt_y</p:attrName>
+                                        </p:attrNameLst>
+                                      </p:cBhvr>
+                                      <p:tavLst>
+                                        <p:tav tm="0">
+                                          <p:val>
+                                            <p:strVal val="#ppt_y+.1"/>
+                                          </p:val>
+                                        </p:tav>
+                                        <p:tav tm="100000">
+                                          <p:val>
+                                            <p:strVal val="#ppt_y"/>
+                                          </p:val>
+                                        </p:tav>
+                                      </p:tavLst>
+                                    </p:anim>
+                                  </p:childTnLst>
+                                </p:cTn>
+                              </p:par>
+                            </p:childTnLst>
+                          </p:cTn>
+                        </p:par>
+                      </p:childTnLst>
+                    </p:cTn>
+                  </p:par>
+                </p:childTnLst>
+              </p:cTn>
+              <p:prevCondLst>
+                <p:cond evt="onPrev" delay="0">
+                  <p:tgtEl>
+                    <p:sldTgt/>
+                  </p:tgtEl>
+                </p:cond>
+              </p:prevCondLst>
+              <p:nextCondLst>
+                <p:cond evt="onNext" delay="0">
+                  <p:tgtEl>
+                    <p:sldTgt/>
+                  </p:tgtEl>
+                </p:cond>
+              </p:nextCondLst>
+            </p:seq>
+          </p:childTnLst>
+        </p:cTn>
+      </p:par>
+    </p:tnLst>
+  </p:timing>
 </p:sld>
 </file>
 
@@ -21843,7 +23300,7 @@
       <p:sp>
         <p:nvSpPr>
           <p:cNvPr id="19" name="Action Button: Go Forward or Next 18">
-            <a:hlinkClick r:id="rId2" action="ppaction://hlinkfile" highlightClick="1"/>
+            <a:hlinkClick r:id="rId3" action="ppaction://hlinkfile" highlightClick="1"/>
             <a:extLst>
               <a:ext uri="{FF2B5EF4-FFF2-40B4-BE49-F238E27FC236}">
                 <a16:creationId xmlns:a16="http://schemas.microsoft.com/office/drawing/2014/main" id="{C9D42690-931B-4BCE-8C46-184DC53597CC}"/>
@@ -21890,7 +23347,7 @@
       <p:sp>
         <p:nvSpPr>
           <p:cNvPr id="20" name="Action Button: Go Forward or Next 19">
-            <a:hlinkClick r:id="rId3" action="ppaction://hlinkfile" highlightClick="1"/>
+            <a:hlinkClick r:id="rId4" action="ppaction://hlinkfile" highlightClick="1"/>
             <a:extLst>
               <a:ext uri="{FF2B5EF4-FFF2-40B4-BE49-F238E27FC236}">
                 <a16:creationId xmlns:a16="http://schemas.microsoft.com/office/drawing/2014/main" id="{36131B24-E1ED-4A88-BE0C-578D850F9483}"/>
@@ -22178,14 +23635,14 @@
           <a:lstStyle/>
           <a:p>
             <a:r>
-              <a:rPr lang="en-US">
+              <a:rPr lang="en-US" dirty="0">
                 <a:solidFill>
                   <a:srgbClr val="52493D"/>
                 </a:solidFill>
               </a:rPr>
-              <a:t>Camera pose estimation result</a:t>
+              <a:t>Camera pose estimation</a:t>
             </a:r>
-            <a:endParaRPr lang="en-ID">
+            <a:endParaRPr lang="en-ID" dirty="0">
               <a:solidFill>
                 <a:srgbClr val="52493D"/>
               </a:solidFill>
@@ -22208,7 +23665,7 @@
           <p:nvPr/>
         </p:nvPicPr>
         <p:blipFill rotWithShape="1">
-          <a:blip r:embed="rId2">
+          <a:blip r:embed="rId3">
             <a:extLst>
               <a:ext uri="{28A0092B-C50C-407E-A947-70E740481C1C}">
                 <a14:useLocalDpi xmlns:a14="http://schemas.microsoft.com/office/drawing/2010/main" val="0"/>
@@ -22458,7 +23915,7 @@
           <p:nvPr/>
         </p:nvPicPr>
         <p:blipFill rotWithShape="1">
-          <a:blip r:embed="rId3">
+          <a:blip r:embed="rId4">
             <a:extLst>
               <a:ext uri="{28A0092B-C50C-407E-A947-70E740481C1C}">
                 <a14:useLocalDpi xmlns:a14="http://schemas.microsoft.com/office/drawing/2010/main" val="0"/>
@@ -22591,7 +24048,7 @@
             </a:r>
             <a:r>
               <a:rPr lang="en-ID" dirty="0">
-                <a:hlinkClick r:id="rId4"/>
+                <a:hlinkClick r:id="rId5"/>
               </a:rPr>
               <a:t>https://docs.opencv.org/2.4/doc/tutorials/imgproc/imgtrans/hough_circle/hough_circle.html</a:t>
             </a:r>
@@ -22710,6 +24167,726 @@
   <p:clrMapOvr>
     <a:masterClrMapping/>
   </p:clrMapOvr>
+  <p:timing>
+    <p:tnLst>
+      <p:par>
+        <p:cTn id="1" dur="indefinite" restart="never" nodeType="tmRoot">
+          <p:childTnLst>
+            <p:seq concurrent="1" nextAc="seek">
+              <p:cTn id="2" dur="indefinite" nodeType="mainSeq">
+                <p:childTnLst>
+                  <p:par>
+                    <p:cTn id="3" fill="hold">
+                      <p:stCondLst>
+                        <p:cond delay="indefinite"/>
+                      </p:stCondLst>
+                      <p:childTnLst>
+                        <p:par>
+                          <p:cTn id="4" fill="hold">
+                            <p:stCondLst>
+                              <p:cond delay="0"/>
+                            </p:stCondLst>
+                            <p:childTnLst>
+                              <p:par>
+                                <p:cTn id="5" presetID="42" presetClass="entr" presetSubtype="0" fill="hold" nodeType="clickEffect">
+                                  <p:stCondLst>
+                                    <p:cond delay="0"/>
+                                  </p:stCondLst>
+                                  <p:childTnLst>
+                                    <p:set>
+                                      <p:cBhvr>
+                                        <p:cTn id="6" dur="1" fill="hold">
+                                          <p:stCondLst>
+                                            <p:cond delay="0"/>
+                                          </p:stCondLst>
+                                        </p:cTn>
+                                        <p:tgtEl>
+                                          <p:spTgt spid="12">
+                                            <p:txEl>
+                                              <p:pRg st="0" end="0"/>
+                                            </p:txEl>
+                                          </p:spTgt>
+                                        </p:tgtEl>
+                                        <p:attrNameLst>
+                                          <p:attrName>style.visibility</p:attrName>
+                                        </p:attrNameLst>
+                                      </p:cBhvr>
+                                      <p:to>
+                                        <p:strVal val="visible"/>
+                                      </p:to>
+                                    </p:set>
+                                    <p:animEffect transition="in" filter="fade">
+                                      <p:cBhvr>
+                                        <p:cTn id="7" dur="1000"/>
+                                        <p:tgtEl>
+                                          <p:spTgt spid="12">
+                                            <p:txEl>
+                                              <p:pRg st="0" end="0"/>
+                                            </p:txEl>
+                                          </p:spTgt>
+                                        </p:tgtEl>
+                                      </p:cBhvr>
+                                    </p:animEffect>
+                                    <p:anim calcmode="lin" valueType="num">
+                                      <p:cBhvr>
+                                        <p:cTn id="8" dur="1000" fill="hold"/>
+                                        <p:tgtEl>
+                                          <p:spTgt spid="12">
+                                            <p:txEl>
+                                              <p:pRg st="0" end="0"/>
+                                            </p:txEl>
+                                          </p:spTgt>
+                                        </p:tgtEl>
+                                        <p:attrNameLst>
+                                          <p:attrName>ppt_x</p:attrName>
+                                        </p:attrNameLst>
+                                      </p:cBhvr>
+                                      <p:tavLst>
+                                        <p:tav tm="0">
+                                          <p:val>
+                                            <p:strVal val="#ppt_x"/>
+                                          </p:val>
+                                        </p:tav>
+                                        <p:tav tm="100000">
+                                          <p:val>
+                                            <p:strVal val="#ppt_x"/>
+                                          </p:val>
+                                        </p:tav>
+                                      </p:tavLst>
+                                    </p:anim>
+                                    <p:anim calcmode="lin" valueType="num">
+                                      <p:cBhvr>
+                                        <p:cTn id="9" dur="1000" fill="hold"/>
+                                        <p:tgtEl>
+                                          <p:spTgt spid="12">
+                                            <p:txEl>
+                                              <p:pRg st="0" end="0"/>
+                                            </p:txEl>
+                                          </p:spTgt>
+                                        </p:tgtEl>
+                                        <p:attrNameLst>
+                                          <p:attrName>ppt_y</p:attrName>
+                                        </p:attrNameLst>
+                                      </p:cBhvr>
+                                      <p:tavLst>
+                                        <p:tav tm="0">
+                                          <p:val>
+                                            <p:strVal val="#ppt_y+.1"/>
+                                          </p:val>
+                                        </p:tav>
+                                        <p:tav tm="100000">
+                                          <p:val>
+                                            <p:strVal val="#ppt_y"/>
+                                          </p:val>
+                                        </p:tav>
+                                      </p:tavLst>
+                                    </p:anim>
+                                  </p:childTnLst>
+                                </p:cTn>
+                              </p:par>
+                            </p:childTnLst>
+                          </p:cTn>
+                        </p:par>
+                      </p:childTnLst>
+                    </p:cTn>
+                  </p:par>
+                  <p:par>
+                    <p:cTn id="10" fill="hold">
+                      <p:stCondLst>
+                        <p:cond delay="indefinite"/>
+                      </p:stCondLst>
+                      <p:childTnLst>
+                        <p:par>
+                          <p:cTn id="11" fill="hold">
+                            <p:stCondLst>
+                              <p:cond delay="0"/>
+                            </p:stCondLst>
+                            <p:childTnLst>
+                              <p:par>
+                                <p:cTn id="12" presetID="42" presetClass="entr" presetSubtype="0" fill="hold" nodeType="clickEffect">
+                                  <p:stCondLst>
+                                    <p:cond delay="0"/>
+                                  </p:stCondLst>
+                                  <p:childTnLst>
+                                    <p:set>
+                                      <p:cBhvr>
+                                        <p:cTn id="13" dur="1" fill="hold">
+                                          <p:stCondLst>
+                                            <p:cond delay="0"/>
+                                          </p:stCondLst>
+                                        </p:cTn>
+                                        <p:tgtEl>
+                                          <p:spTgt spid="12">
+                                            <p:txEl>
+                                              <p:pRg st="1" end="1"/>
+                                            </p:txEl>
+                                          </p:spTgt>
+                                        </p:tgtEl>
+                                        <p:attrNameLst>
+                                          <p:attrName>style.visibility</p:attrName>
+                                        </p:attrNameLst>
+                                      </p:cBhvr>
+                                      <p:to>
+                                        <p:strVal val="visible"/>
+                                      </p:to>
+                                    </p:set>
+                                    <p:animEffect transition="in" filter="fade">
+                                      <p:cBhvr>
+                                        <p:cTn id="14" dur="1000"/>
+                                        <p:tgtEl>
+                                          <p:spTgt spid="12">
+                                            <p:txEl>
+                                              <p:pRg st="1" end="1"/>
+                                            </p:txEl>
+                                          </p:spTgt>
+                                        </p:tgtEl>
+                                      </p:cBhvr>
+                                    </p:animEffect>
+                                    <p:anim calcmode="lin" valueType="num">
+                                      <p:cBhvr>
+                                        <p:cTn id="15" dur="1000" fill="hold"/>
+                                        <p:tgtEl>
+                                          <p:spTgt spid="12">
+                                            <p:txEl>
+                                              <p:pRg st="1" end="1"/>
+                                            </p:txEl>
+                                          </p:spTgt>
+                                        </p:tgtEl>
+                                        <p:attrNameLst>
+                                          <p:attrName>ppt_x</p:attrName>
+                                        </p:attrNameLst>
+                                      </p:cBhvr>
+                                      <p:tavLst>
+                                        <p:tav tm="0">
+                                          <p:val>
+                                            <p:strVal val="#ppt_x"/>
+                                          </p:val>
+                                        </p:tav>
+                                        <p:tav tm="100000">
+                                          <p:val>
+                                            <p:strVal val="#ppt_x"/>
+                                          </p:val>
+                                        </p:tav>
+                                      </p:tavLst>
+                                    </p:anim>
+                                    <p:anim calcmode="lin" valueType="num">
+                                      <p:cBhvr>
+                                        <p:cTn id="16" dur="1000" fill="hold"/>
+                                        <p:tgtEl>
+                                          <p:spTgt spid="12">
+                                            <p:txEl>
+                                              <p:pRg st="1" end="1"/>
+                                            </p:txEl>
+                                          </p:spTgt>
+                                        </p:tgtEl>
+                                        <p:attrNameLst>
+                                          <p:attrName>ppt_y</p:attrName>
+                                        </p:attrNameLst>
+                                      </p:cBhvr>
+                                      <p:tavLst>
+                                        <p:tav tm="0">
+                                          <p:val>
+                                            <p:strVal val="#ppt_y+.1"/>
+                                          </p:val>
+                                        </p:tav>
+                                        <p:tav tm="100000">
+                                          <p:val>
+                                            <p:strVal val="#ppt_y"/>
+                                          </p:val>
+                                        </p:tav>
+                                      </p:tavLst>
+                                    </p:anim>
+                                  </p:childTnLst>
+                                </p:cTn>
+                              </p:par>
+                            </p:childTnLst>
+                          </p:cTn>
+                        </p:par>
+                      </p:childTnLst>
+                    </p:cTn>
+                  </p:par>
+                  <p:par>
+                    <p:cTn id="17" fill="hold">
+                      <p:stCondLst>
+                        <p:cond delay="indefinite"/>
+                      </p:stCondLst>
+                      <p:childTnLst>
+                        <p:par>
+                          <p:cTn id="18" fill="hold">
+                            <p:stCondLst>
+                              <p:cond delay="0"/>
+                            </p:stCondLst>
+                            <p:childTnLst>
+                              <p:par>
+                                <p:cTn id="19" presetID="42" presetClass="entr" presetSubtype="0" fill="hold" nodeType="clickEffect">
+                                  <p:stCondLst>
+                                    <p:cond delay="0"/>
+                                  </p:stCondLst>
+                                  <p:childTnLst>
+                                    <p:set>
+                                      <p:cBhvr>
+                                        <p:cTn id="20" dur="1" fill="hold">
+                                          <p:stCondLst>
+                                            <p:cond delay="0"/>
+                                          </p:stCondLst>
+                                        </p:cTn>
+                                        <p:tgtEl>
+                                          <p:spTgt spid="12">
+                                            <p:txEl>
+                                              <p:pRg st="2" end="2"/>
+                                            </p:txEl>
+                                          </p:spTgt>
+                                        </p:tgtEl>
+                                        <p:attrNameLst>
+                                          <p:attrName>style.visibility</p:attrName>
+                                        </p:attrNameLst>
+                                      </p:cBhvr>
+                                      <p:to>
+                                        <p:strVal val="visible"/>
+                                      </p:to>
+                                    </p:set>
+                                    <p:animEffect transition="in" filter="fade">
+                                      <p:cBhvr>
+                                        <p:cTn id="21" dur="1000"/>
+                                        <p:tgtEl>
+                                          <p:spTgt spid="12">
+                                            <p:txEl>
+                                              <p:pRg st="2" end="2"/>
+                                            </p:txEl>
+                                          </p:spTgt>
+                                        </p:tgtEl>
+                                      </p:cBhvr>
+                                    </p:animEffect>
+                                    <p:anim calcmode="lin" valueType="num">
+                                      <p:cBhvr>
+                                        <p:cTn id="22" dur="1000" fill="hold"/>
+                                        <p:tgtEl>
+                                          <p:spTgt spid="12">
+                                            <p:txEl>
+                                              <p:pRg st="2" end="2"/>
+                                            </p:txEl>
+                                          </p:spTgt>
+                                        </p:tgtEl>
+                                        <p:attrNameLst>
+                                          <p:attrName>ppt_x</p:attrName>
+                                        </p:attrNameLst>
+                                      </p:cBhvr>
+                                      <p:tavLst>
+                                        <p:tav tm="0">
+                                          <p:val>
+                                            <p:strVal val="#ppt_x"/>
+                                          </p:val>
+                                        </p:tav>
+                                        <p:tav tm="100000">
+                                          <p:val>
+                                            <p:strVal val="#ppt_x"/>
+                                          </p:val>
+                                        </p:tav>
+                                      </p:tavLst>
+                                    </p:anim>
+                                    <p:anim calcmode="lin" valueType="num">
+                                      <p:cBhvr>
+                                        <p:cTn id="23" dur="1000" fill="hold"/>
+                                        <p:tgtEl>
+                                          <p:spTgt spid="12">
+                                            <p:txEl>
+                                              <p:pRg st="2" end="2"/>
+                                            </p:txEl>
+                                          </p:spTgt>
+                                        </p:tgtEl>
+                                        <p:attrNameLst>
+                                          <p:attrName>ppt_y</p:attrName>
+                                        </p:attrNameLst>
+                                      </p:cBhvr>
+                                      <p:tavLst>
+                                        <p:tav tm="0">
+                                          <p:val>
+                                            <p:strVal val="#ppt_y+.1"/>
+                                          </p:val>
+                                        </p:tav>
+                                        <p:tav tm="100000">
+                                          <p:val>
+                                            <p:strVal val="#ppt_y"/>
+                                          </p:val>
+                                        </p:tav>
+                                      </p:tavLst>
+                                    </p:anim>
+                                  </p:childTnLst>
+                                </p:cTn>
+                              </p:par>
+                            </p:childTnLst>
+                          </p:cTn>
+                        </p:par>
+                      </p:childTnLst>
+                    </p:cTn>
+                  </p:par>
+                  <p:par>
+                    <p:cTn id="24" fill="hold">
+                      <p:stCondLst>
+                        <p:cond delay="indefinite"/>
+                      </p:stCondLst>
+                      <p:childTnLst>
+                        <p:par>
+                          <p:cTn id="25" fill="hold">
+                            <p:stCondLst>
+                              <p:cond delay="0"/>
+                            </p:stCondLst>
+                            <p:childTnLst>
+                              <p:par>
+                                <p:cTn id="26" presetID="42" presetClass="entr" presetSubtype="0" fill="hold" nodeType="clickEffect">
+                                  <p:stCondLst>
+                                    <p:cond delay="0"/>
+                                  </p:stCondLst>
+                                  <p:childTnLst>
+                                    <p:set>
+                                      <p:cBhvr>
+                                        <p:cTn id="27" dur="1" fill="hold">
+                                          <p:stCondLst>
+                                            <p:cond delay="0"/>
+                                          </p:stCondLst>
+                                        </p:cTn>
+                                        <p:tgtEl>
+                                          <p:spTgt spid="12">
+                                            <p:txEl>
+                                              <p:pRg st="3" end="3"/>
+                                            </p:txEl>
+                                          </p:spTgt>
+                                        </p:tgtEl>
+                                        <p:attrNameLst>
+                                          <p:attrName>style.visibility</p:attrName>
+                                        </p:attrNameLst>
+                                      </p:cBhvr>
+                                      <p:to>
+                                        <p:strVal val="visible"/>
+                                      </p:to>
+                                    </p:set>
+                                    <p:animEffect transition="in" filter="fade">
+                                      <p:cBhvr>
+                                        <p:cTn id="28" dur="1000"/>
+                                        <p:tgtEl>
+                                          <p:spTgt spid="12">
+                                            <p:txEl>
+                                              <p:pRg st="3" end="3"/>
+                                            </p:txEl>
+                                          </p:spTgt>
+                                        </p:tgtEl>
+                                      </p:cBhvr>
+                                    </p:animEffect>
+                                    <p:anim calcmode="lin" valueType="num">
+                                      <p:cBhvr>
+                                        <p:cTn id="29" dur="1000" fill="hold"/>
+                                        <p:tgtEl>
+                                          <p:spTgt spid="12">
+                                            <p:txEl>
+                                              <p:pRg st="3" end="3"/>
+                                            </p:txEl>
+                                          </p:spTgt>
+                                        </p:tgtEl>
+                                        <p:attrNameLst>
+                                          <p:attrName>ppt_x</p:attrName>
+                                        </p:attrNameLst>
+                                      </p:cBhvr>
+                                      <p:tavLst>
+                                        <p:tav tm="0">
+                                          <p:val>
+                                            <p:strVal val="#ppt_x"/>
+                                          </p:val>
+                                        </p:tav>
+                                        <p:tav tm="100000">
+                                          <p:val>
+                                            <p:strVal val="#ppt_x"/>
+                                          </p:val>
+                                        </p:tav>
+                                      </p:tavLst>
+                                    </p:anim>
+                                    <p:anim calcmode="lin" valueType="num">
+                                      <p:cBhvr>
+                                        <p:cTn id="30" dur="1000" fill="hold"/>
+                                        <p:tgtEl>
+                                          <p:spTgt spid="12">
+                                            <p:txEl>
+                                              <p:pRg st="3" end="3"/>
+                                            </p:txEl>
+                                          </p:spTgt>
+                                        </p:tgtEl>
+                                        <p:attrNameLst>
+                                          <p:attrName>ppt_y</p:attrName>
+                                        </p:attrNameLst>
+                                      </p:cBhvr>
+                                      <p:tavLst>
+                                        <p:tav tm="0">
+                                          <p:val>
+                                            <p:strVal val="#ppt_y+.1"/>
+                                          </p:val>
+                                        </p:tav>
+                                        <p:tav tm="100000">
+                                          <p:val>
+                                            <p:strVal val="#ppt_y"/>
+                                          </p:val>
+                                        </p:tav>
+                                      </p:tavLst>
+                                    </p:anim>
+                                  </p:childTnLst>
+                                </p:cTn>
+                              </p:par>
+                            </p:childTnLst>
+                          </p:cTn>
+                        </p:par>
+                      </p:childTnLst>
+                    </p:cTn>
+                  </p:par>
+                  <p:par>
+                    <p:cTn id="31" fill="hold">
+                      <p:stCondLst>
+                        <p:cond delay="indefinite"/>
+                      </p:stCondLst>
+                      <p:childTnLst>
+                        <p:par>
+                          <p:cTn id="32" fill="hold">
+                            <p:stCondLst>
+                              <p:cond delay="0"/>
+                            </p:stCondLst>
+                            <p:childTnLst>
+                              <p:par>
+                                <p:cTn id="33" presetID="42" presetClass="entr" presetSubtype="0" fill="hold" nodeType="clickEffect">
+                                  <p:stCondLst>
+                                    <p:cond delay="0"/>
+                                  </p:stCondLst>
+                                  <p:childTnLst>
+                                    <p:set>
+                                      <p:cBhvr>
+                                        <p:cTn id="34" dur="1" fill="hold">
+                                          <p:stCondLst>
+                                            <p:cond delay="0"/>
+                                          </p:stCondLst>
+                                        </p:cTn>
+                                        <p:tgtEl>
+                                          <p:spTgt spid="12">
+                                            <p:txEl>
+                                              <p:pRg st="4" end="4"/>
+                                            </p:txEl>
+                                          </p:spTgt>
+                                        </p:tgtEl>
+                                        <p:attrNameLst>
+                                          <p:attrName>style.visibility</p:attrName>
+                                        </p:attrNameLst>
+                                      </p:cBhvr>
+                                      <p:to>
+                                        <p:strVal val="visible"/>
+                                      </p:to>
+                                    </p:set>
+                                    <p:animEffect transition="in" filter="fade">
+                                      <p:cBhvr>
+                                        <p:cTn id="35" dur="1000"/>
+                                        <p:tgtEl>
+                                          <p:spTgt spid="12">
+                                            <p:txEl>
+                                              <p:pRg st="4" end="4"/>
+                                            </p:txEl>
+                                          </p:spTgt>
+                                        </p:tgtEl>
+                                      </p:cBhvr>
+                                    </p:animEffect>
+                                    <p:anim calcmode="lin" valueType="num">
+                                      <p:cBhvr>
+                                        <p:cTn id="36" dur="1000" fill="hold"/>
+                                        <p:tgtEl>
+                                          <p:spTgt spid="12">
+                                            <p:txEl>
+                                              <p:pRg st="4" end="4"/>
+                                            </p:txEl>
+                                          </p:spTgt>
+                                        </p:tgtEl>
+                                        <p:attrNameLst>
+                                          <p:attrName>ppt_x</p:attrName>
+                                        </p:attrNameLst>
+                                      </p:cBhvr>
+                                      <p:tavLst>
+                                        <p:tav tm="0">
+                                          <p:val>
+                                            <p:strVal val="#ppt_x"/>
+                                          </p:val>
+                                        </p:tav>
+                                        <p:tav tm="100000">
+                                          <p:val>
+                                            <p:strVal val="#ppt_x"/>
+                                          </p:val>
+                                        </p:tav>
+                                      </p:tavLst>
+                                    </p:anim>
+                                    <p:anim calcmode="lin" valueType="num">
+                                      <p:cBhvr>
+                                        <p:cTn id="37" dur="1000" fill="hold"/>
+                                        <p:tgtEl>
+                                          <p:spTgt spid="12">
+                                            <p:txEl>
+                                              <p:pRg st="4" end="4"/>
+                                            </p:txEl>
+                                          </p:spTgt>
+                                        </p:tgtEl>
+                                        <p:attrNameLst>
+                                          <p:attrName>ppt_y</p:attrName>
+                                        </p:attrNameLst>
+                                      </p:cBhvr>
+                                      <p:tavLst>
+                                        <p:tav tm="0">
+                                          <p:val>
+                                            <p:strVal val="#ppt_y+.1"/>
+                                          </p:val>
+                                        </p:tav>
+                                        <p:tav tm="100000">
+                                          <p:val>
+                                            <p:strVal val="#ppt_y"/>
+                                          </p:val>
+                                        </p:tav>
+                                      </p:tavLst>
+                                    </p:anim>
+                                  </p:childTnLst>
+                                </p:cTn>
+                              </p:par>
+                            </p:childTnLst>
+                          </p:cTn>
+                        </p:par>
+                      </p:childTnLst>
+                    </p:cTn>
+                  </p:par>
+                  <p:par>
+                    <p:cTn id="38" fill="hold">
+                      <p:stCondLst>
+                        <p:cond delay="indefinite"/>
+                      </p:stCondLst>
+                      <p:childTnLst>
+                        <p:par>
+                          <p:cTn id="39" fill="hold">
+                            <p:stCondLst>
+                              <p:cond delay="0"/>
+                            </p:stCondLst>
+                            <p:childTnLst>
+                              <p:par>
+                                <p:cTn id="40" presetID="42" presetClass="entr" presetSubtype="0" fill="hold" nodeType="clickEffect">
+                                  <p:stCondLst>
+                                    <p:cond delay="0"/>
+                                  </p:stCondLst>
+                                  <p:childTnLst>
+                                    <p:set>
+                                      <p:cBhvr>
+                                        <p:cTn id="41" dur="1" fill="hold">
+                                          <p:stCondLst>
+                                            <p:cond delay="0"/>
+                                          </p:stCondLst>
+                                        </p:cTn>
+                                        <p:tgtEl>
+                                          <p:spTgt spid="12">
+                                            <p:txEl>
+                                              <p:pRg st="5" end="5"/>
+                                            </p:txEl>
+                                          </p:spTgt>
+                                        </p:tgtEl>
+                                        <p:attrNameLst>
+                                          <p:attrName>style.visibility</p:attrName>
+                                        </p:attrNameLst>
+                                      </p:cBhvr>
+                                      <p:to>
+                                        <p:strVal val="visible"/>
+                                      </p:to>
+                                    </p:set>
+                                    <p:animEffect transition="in" filter="fade">
+                                      <p:cBhvr>
+                                        <p:cTn id="42" dur="1000"/>
+                                        <p:tgtEl>
+                                          <p:spTgt spid="12">
+                                            <p:txEl>
+                                              <p:pRg st="5" end="5"/>
+                                            </p:txEl>
+                                          </p:spTgt>
+                                        </p:tgtEl>
+                                      </p:cBhvr>
+                                    </p:animEffect>
+                                    <p:anim calcmode="lin" valueType="num">
+                                      <p:cBhvr>
+                                        <p:cTn id="43" dur="1000" fill="hold"/>
+                                        <p:tgtEl>
+                                          <p:spTgt spid="12">
+                                            <p:txEl>
+                                              <p:pRg st="5" end="5"/>
+                                            </p:txEl>
+                                          </p:spTgt>
+                                        </p:tgtEl>
+                                        <p:attrNameLst>
+                                          <p:attrName>ppt_x</p:attrName>
+                                        </p:attrNameLst>
+                                      </p:cBhvr>
+                                      <p:tavLst>
+                                        <p:tav tm="0">
+                                          <p:val>
+                                            <p:strVal val="#ppt_x"/>
+                                          </p:val>
+                                        </p:tav>
+                                        <p:tav tm="100000">
+                                          <p:val>
+                                            <p:strVal val="#ppt_x"/>
+                                          </p:val>
+                                        </p:tav>
+                                      </p:tavLst>
+                                    </p:anim>
+                                    <p:anim calcmode="lin" valueType="num">
+                                      <p:cBhvr>
+                                        <p:cTn id="44" dur="1000" fill="hold"/>
+                                        <p:tgtEl>
+                                          <p:spTgt spid="12">
+                                            <p:txEl>
+                                              <p:pRg st="5" end="5"/>
+                                            </p:txEl>
+                                          </p:spTgt>
+                                        </p:tgtEl>
+                                        <p:attrNameLst>
+                                          <p:attrName>ppt_y</p:attrName>
+                                        </p:attrNameLst>
+                                      </p:cBhvr>
+                                      <p:tavLst>
+                                        <p:tav tm="0">
+                                          <p:val>
+                                            <p:strVal val="#ppt_y+.1"/>
+                                          </p:val>
+                                        </p:tav>
+                                        <p:tav tm="100000">
+                                          <p:val>
+                                            <p:strVal val="#ppt_y"/>
+                                          </p:val>
+                                        </p:tav>
+                                      </p:tavLst>
+                                    </p:anim>
+                                  </p:childTnLst>
+                                </p:cTn>
+                              </p:par>
+                            </p:childTnLst>
+                          </p:cTn>
+                        </p:par>
+                      </p:childTnLst>
+                    </p:cTn>
+                  </p:par>
+                </p:childTnLst>
+              </p:cTn>
+              <p:prevCondLst>
+                <p:cond evt="onPrev" delay="0">
+                  <p:tgtEl>
+                    <p:sldTgt/>
+                  </p:tgtEl>
+                </p:cond>
+              </p:prevCondLst>
+              <p:nextCondLst>
+                <p:cond evt="onNext" delay="0">
+                  <p:tgtEl>
+                    <p:sldTgt/>
+                  </p:tgtEl>
+                </p:cond>
+              </p:nextCondLst>
+            </p:seq>
+          </p:childTnLst>
+        </p:cTn>
+      </p:par>
+    </p:tnLst>
+  </p:timing>
 </p:sld>
 </file>
 
@@ -25374,6 +27551,1920 @@
   <p:clrMapOvr>
     <a:masterClrMapping/>
   </p:clrMapOvr>
+  <p:timing>
+    <p:tnLst>
+      <p:par>
+        <p:cTn id="1" dur="indefinite" restart="never" nodeType="tmRoot">
+          <p:childTnLst>
+            <p:seq concurrent="1" nextAc="seek">
+              <p:cTn id="2" dur="indefinite" nodeType="mainSeq">
+                <p:childTnLst>
+                  <p:par>
+                    <p:cTn id="3" fill="hold">
+                      <p:stCondLst>
+                        <p:cond delay="indefinite"/>
+                      </p:stCondLst>
+                      <p:childTnLst>
+                        <p:par>
+                          <p:cTn id="4" fill="hold">
+                            <p:stCondLst>
+                              <p:cond delay="0"/>
+                            </p:stCondLst>
+                            <p:childTnLst>
+                              <p:par>
+                                <p:cTn id="5" presetID="42" presetClass="entr" presetSubtype="0" fill="hold" nodeType="clickEffect">
+                                  <p:stCondLst>
+                                    <p:cond delay="0"/>
+                                  </p:stCondLst>
+                                  <p:childTnLst>
+                                    <p:set>
+                                      <p:cBhvr>
+                                        <p:cTn id="6" dur="1" fill="hold">
+                                          <p:stCondLst>
+                                            <p:cond delay="0"/>
+                                          </p:stCondLst>
+                                        </p:cTn>
+                                        <p:tgtEl>
+                                          <p:spTgt spid="68"/>
+                                        </p:tgtEl>
+                                        <p:attrNameLst>
+                                          <p:attrName>style.visibility</p:attrName>
+                                        </p:attrNameLst>
+                                      </p:cBhvr>
+                                      <p:to>
+                                        <p:strVal val="visible"/>
+                                      </p:to>
+                                    </p:set>
+                                    <p:animEffect transition="in" filter="fade">
+                                      <p:cBhvr>
+                                        <p:cTn id="7" dur="1000"/>
+                                        <p:tgtEl>
+                                          <p:spTgt spid="68"/>
+                                        </p:tgtEl>
+                                      </p:cBhvr>
+                                    </p:animEffect>
+                                    <p:anim calcmode="lin" valueType="num">
+                                      <p:cBhvr>
+                                        <p:cTn id="8" dur="1000" fill="hold"/>
+                                        <p:tgtEl>
+                                          <p:spTgt spid="68"/>
+                                        </p:tgtEl>
+                                        <p:attrNameLst>
+                                          <p:attrName>ppt_x</p:attrName>
+                                        </p:attrNameLst>
+                                      </p:cBhvr>
+                                      <p:tavLst>
+                                        <p:tav tm="0">
+                                          <p:val>
+                                            <p:strVal val="#ppt_x"/>
+                                          </p:val>
+                                        </p:tav>
+                                        <p:tav tm="100000">
+                                          <p:val>
+                                            <p:strVal val="#ppt_x"/>
+                                          </p:val>
+                                        </p:tav>
+                                      </p:tavLst>
+                                    </p:anim>
+                                    <p:anim calcmode="lin" valueType="num">
+                                      <p:cBhvr>
+                                        <p:cTn id="9" dur="1000" fill="hold"/>
+                                        <p:tgtEl>
+                                          <p:spTgt spid="68"/>
+                                        </p:tgtEl>
+                                        <p:attrNameLst>
+                                          <p:attrName>ppt_y</p:attrName>
+                                        </p:attrNameLst>
+                                      </p:cBhvr>
+                                      <p:tavLst>
+                                        <p:tav tm="0">
+                                          <p:val>
+                                            <p:strVal val="#ppt_y+.1"/>
+                                          </p:val>
+                                        </p:tav>
+                                        <p:tav tm="100000">
+                                          <p:val>
+                                            <p:strVal val="#ppt_y"/>
+                                          </p:val>
+                                        </p:tav>
+                                      </p:tavLst>
+                                    </p:anim>
+                                  </p:childTnLst>
+                                </p:cTn>
+                              </p:par>
+                            </p:childTnLst>
+                          </p:cTn>
+                        </p:par>
+                      </p:childTnLst>
+                    </p:cTn>
+                  </p:par>
+                  <p:par>
+                    <p:cTn id="10" fill="hold">
+                      <p:stCondLst>
+                        <p:cond delay="indefinite"/>
+                      </p:stCondLst>
+                      <p:childTnLst>
+                        <p:par>
+                          <p:cTn id="11" fill="hold">
+                            <p:stCondLst>
+                              <p:cond delay="0"/>
+                            </p:stCondLst>
+                            <p:childTnLst>
+                              <p:par>
+                                <p:cTn id="12" presetID="2" presetClass="entr" presetSubtype="4" fill="hold" grpId="0" nodeType="clickEffect">
+                                  <p:stCondLst>
+                                    <p:cond delay="0"/>
+                                  </p:stCondLst>
+                                  <p:childTnLst>
+                                    <p:set>
+                                      <p:cBhvr>
+                                        <p:cTn id="13" dur="1" fill="hold">
+                                          <p:stCondLst>
+                                            <p:cond delay="0"/>
+                                          </p:stCondLst>
+                                        </p:cTn>
+                                        <p:tgtEl>
+                                          <p:spTgt spid="43"/>
+                                        </p:tgtEl>
+                                        <p:attrNameLst>
+                                          <p:attrName>style.visibility</p:attrName>
+                                        </p:attrNameLst>
+                                      </p:cBhvr>
+                                      <p:to>
+                                        <p:strVal val="visible"/>
+                                      </p:to>
+                                    </p:set>
+                                    <p:anim calcmode="lin" valueType="num">
+                                      <p:cBhvr additive="base">
+                                        <p:cTn id="14" dur="500" fill="hold"/>
+                                        <p:tgtEl>
+                                          <p:spTgt spid="43"/>
+                                        </p:tgtEl>
+                                        <p:attrNameLst>
+                                          <p:attrName>ppt_x</p:attrName>
+                                        </p:attrNameLst>
+                                      </p:cBhvr>
+                                      <p:tavLst>
+                                        <p:tav tm="0">
+                                          <p:val>
+                                            <p:strVal val="#ppt_x"/>
+                                          </p:val>
+                                        </p:tav>
+                                        <p:tav tm="100000">
+                                          <p:val>
+                                            <p:strVal val="#ppt_x"/>
+                                          </p:val>
+                                        </p:tav>
+                                      </p:tavLst>
+                                    </p:anim>
+                                    <p:anim calcmode="lin" valueType="num">
+                                      <p:cBhvr additive="base">
+                                        <p:cTn id="15" dur="500" fill="hold"/>
+                                        <p:tgtEl>
+                                          <p:spTgt spid="43"/>
+                                        </p:tgtEl>
+                                        <p:attrNameLst>
+                                          <p:attrName>ppt_y</p:attrName>
+                                        </p:attrNameLst>
+                                      </p:cBhvr>
+                                      <p:tavLst>
+                                        <p:tav tm="0">
+                                          <p:val>
+                                            <p:strVal val="1+#ppt_h/2"/>
+                                          </p:val>
+                                        </p:tav>
+                                        <p:tav tm="100000">
+                                          <p:val>
+                                            <p:strVal val="#ppt_y"/>
+                                          </p:val>
+                                        </p:tav>
+                                      </p:tavLst>
+                                    </p:anim>
+                                  </p:childTnLst>
+                                </p:cTn>
+                              </p:par>
+                              <p:par>
+                                <p:cTn id="16" presetID="2" presetClass="entr" presetSubtype="4" fill="hold" nodeType="withEffect">
+                                  <p:stCondLst>
+                                    <p:cond delay="0"/>
+                                  </p:stCondLst>
+                                  <p:childTnLst>
+                                    <p:set>
+                                      <p:cBhvr>
+                                        <p:cTn id="17" dur="1" fill="hold">
+                                          <p:stCondLst>
+                                            <p:cond delay="0"/>
+                                          </p:stCondLst>
+                                        </p:cTn>
+                                        <p:tgtEl>
+                                          <p:spTgt spid="47"/>
+                                        </p:tgtEl>
+                                        <p:attrNameLst>
+                                          <p:attrName>style.visibility</p:attrName>
+                                        </p:attrNameLst>
+                                      </p:cBhvr>
+                                      <p:to>
+                                        <p:strVal val="visible"/>
+                                      </p:to>
+                                    </p:set>
+                                    <p:anim calcmode="lin" valueType="num">
+                                      <p:cBhvr additive="base">
+                                        <p:cTn id="18" dur="500" fill="hold"/>
+                                        <p:tgtEl>
+                                          <p:spTgt spid="47"/>
+                                        </p:tgtEl>
+                                        <p:attrNameLst>
+                                          <p:attrName>ppt_x</p:attrName>
+                                        </p:attrNameLst>
+                                      </p:cBhvr>
+                                      <p:tavLst>
+                                        <p:tav tm="0">
+                                          <p:val>
+                                            <p:strVal val="#ppt_x"/>
+                                          </p:val>
+                                        </p:tav>
+                                        <p:tav tm="100000">
+                                          <p:val>
+                                            <p:strVal val="#ppt_x"/>
+                                          </p:val>
+                                        </p:tav>
+                                      </p:tavLst>
+                                    </p:anim>
+                                    <p:anim calcmode="lin" valueType="num">
+                                      <p:cBhvr additive="base">
+                                        <p:cTn id="19" dur="500" fill="hold"/>
+                                        <p:tgtEl>
+                                          <p:spTgt spid="47"/>
+                                        </p:tgtEl>
+                                        <p:attrNameLst>
+                                          <p:attrName>ppt_y</p:attrName>
+                                        </p:attrNameLst>
+                                      </p:cBhvr>
+                                      <p:tavLst>
+                                        <p:tav tm="0">
+                                          <p:val>
+                                            <p:strVal val="1+#ppt_h/2"/>
+                                          </p:val>
+                                        </p:tav>
+                                        <p:tav tm="100000">
+                                          <p:val>
+                                            <p:strVal val="#ppt_y"/>
+                                          </p:val>
+                                        </p:tav>
+                                      </p:tavLst>
+                                    </p:anim>
+                                  </p:childTnLst>
+                                </p:cTn>
+                              </p:par>
+                              <p:par>
+                                <p:cTn id="20" presetID="2" presetClass="entr" presetSubtype="4" fill="hold" grpId="0" nodeType="withEffect">
+                                  <p:stCondLst>
+                                    <p:cond delay="0"/>
+                                  </p:stCondLst>
+                                  <p:childTnLst>
+                                    <p:set>
+                                      <p:cBhvr>
+                                        <p:cTn id="21" dur="1" fill="hold">
+                                          <p:stCondLst>
+                                            <p:cond delay="0"/>
+                                          </p:stCondLst>
+                                        </p:cTn>
+                                        <p:tgtEl>
+                                          <p:spTgt spid="50"/>
+                                        </p:tgtEl>
+                                        <p:attrNameLst>
+                                          <p:attrName>style.visibility</p:attrName>
+                                        </p:attrNameLst>
+                                      </p:cBhvr>
+                                      <p:to>
+                                        <p:strVal val="visible"/>
+                                      </p:to>
+                                    </p:set>
+                                    <p:anim calcmode="lin" valueType="num">
+                                      <p:cBhvr additive="base">
+                                        <p:cTn id="22" dur="500" fill="hold"/>
+                                        <p:tgtEl>
+                                          <p:spTgt spid="50"/>
+                                        </p:tgtEl>
+                                        <p:attrNameLst>
+                                          <p:attrName>ppt_x</p:attrName>
+                                        </p:attrNameLst>
+                                      </p:cBhvr>
+                                      <p:tavLst>
+                                        <p:tav tm="0">
+                                          <p:val>
+                                            <p:strVal val="#ppt_x"/>
+                                          </p:val>
+                                        </p:tav>
+                                        <p:tav tm="100000">
+                                          <p:val>
+                                            <p:strVal val="#ppt_x"/>
+                                          </p:val>
+                                        </p:tav>
+                                      </p:tavLst>
+                                    </p:anim>
+                                    <p:anim calcmode="lin" valueType="num">
+                                      <p:cBhvr additive="base">
+                                        <p:cTn id="23" dur="500" fill="hold"/>
+                                        <p:tgtEl>
+                                          <p:spTgt spid="50"/>
+                                        </p:tgtEl>
+                                        <p:attrNameLst>
+                                          <p:attrName>ppt_y</p:attrName>
+                                        </p:attrNameLst>
+                                      </p:cBhvr>
+                                      <p:tavLst>
+                                        <p:tav tm="0">
+                                          <p:val>
+                                            <p:strVal val="1+#ppt_h/2"/>
+                                          </p:val>
+                                        </p:tav>
+                                        <p:tav tm="100000">
+                                          <p:val>
+                                            <p:strVal val="#ppt_y"/>
+                                          </p:val>
+                                        </p:tav>
+                                      </p:tavLst>
+                                    </p:anim>
+                                  </p:childTnLst>
+                                </p:cTn>
+                              </p:par>
+                              <p:par>
+                                <p:cTn id="24" presetID="2" presetClass="entr" presetSubtype="4" fill="hold" grpId="0" nodeType="withEffect">
+                                  <p:stCondLst>
+                                    <p:cond delay="0"/>
+                                  </p:stCondLst>
+                                  <p:childTnLst>
+                                    <p:set>
+                                      <p:cBhvr>
+                                        <p:cTn id="25" dur="1" fill="hold">
+                                          <p:stCondLst>
+                                            <p:cond delay="0"/>
+                                          </p:stCondLst>
+                                        </p:cTn>
+                                        <p:tgtEl>
+                                          <p:spTgt spid="51"/>
+                                        </p:tgtEl>
+                                        <p:attrNameLst>
+                                          <p:attrName>style.visibility</p:attrName>
+                                        </p:attrNameLst>
+                                      </p:cBhvr>
+                                      <p:to>
+                                        <p:strVal val="visible"/>
+                                      </p:to>
+                                    </p:set>
+                                    <p:anim calcmode="lin" valueType="num">
+                                      <p:cBhvr additive="base">
+                                        <p:cTn id="26" dur="500" fill="hold"/>
+                                        <p:tgtEl>
+                                          <p:spTgt spid="51"/>
+                                        </p:tgtEl>
+                                        <p:attrNameLst>
+                                          <p:attrName>ppt_x</p:attrName>
+                                        </p:attrNameLst>
+                                      </p:cBhvr>
+                                      <p:tavLst>
+                                        <p:tav tm="0">
+                                          <p:val>
+                                            <p:strVal val="#ppt_x"/>
+                                          </p:val>
+                                        </p:tav>
+                                        <p:tav tm="100000">
+                                          <p:val>
+                                            <p:strVal val="#ppt_x"/>
+                                          </p:val>
+                                        </p:tav>
+                                      </p:tavLst>
+                                    </p:anim>
+                                    <p:anim calcmode="lin" valueType="num">
+                                      <p:cBhvr additive="base">
+                                        <p:cTn id="27" dur="500" fill="hold"/>
+                                        <p:tgtEl>
+                                          <p:spTgt spid="51"/>
+                                        </p:tgtEl>
+                                        <p:attrNameLst>
+                                          <p:attrName>ppt_y</p:attrName>
+                                        </p:attrNameLst>
+                                      </p:cBhvr>
+                                      <p:tavLst>
+                                        <p:tav tm="0">
+                                          <p:val>
+                                            <p:strVal val="1+#ppt_h/2"/>
+                                          </p:val>
+                                        </p:tav>
+                                        <p:tav tm="100000">
+                                          <p:val>
+                                            <p:strVal val="#ppt_y"/>
+                                          </p:val>
+                                        </p:tav>
+                                      </p:tavLst>
+                                    </p:anim>
+                                  </p:childTnLst>
+                                </p:cTn>
+                              </p:par>
+                              <p:par>
+                                <p:cTn id="28" presetID="2" presetClass="entr" presetSubtype="4" fill="hold" nodeType="withEffect">
+                                  <p:stCondLst>
+                                    <p:cond delay="0"/>
+                                  </p:stCondLst>
+                                  <p:childTnLst>
+                                    <p:set>
+                                      <p:cBhvr>
+                                        <p:cTn id="29" dur="1" fill="hold">
+                                          <p:stCondLst>
+                                            <p:cond delay="0"/>
+                                          </p:stCondLst>
+                                        </p:cTn>
+                                        <p:tgtEl>
+                                          <p:spTgt spid="53"/>
+                                        </p:tgtEl>
+                                        <p:attrNameLst>
+                                          <p:attrName>style.visibility</p:attrName>
+                                        </p:attrNameLst>
+                                      </p:cBhvr>
+                                      <p:to>
+                                        <p:strVal val="visible"/>
+                                      </p:to>
+                                    </p:set>
+                                    <p:anim calcmode="lin" valueType="num">
+                                      <p:cBhvr additive="base">
+                                        <p:cTn id="30" dur="500" fill="hold"/>
+                                        <p:tgtEl>
+                                          <p:spTgt spid="53"/>
+                                        </p:tgtEl>
+                                        <p:attrNameLst>
+                                          <p:attrName>ppt_x</p:attrName>
+                                        </p:attrNameLst>
+                                      </p:cBhvr>
+                                      <p:tavLst>
+                                        <p:tav tm="0">
+                                          <p:val>
+                                            <p:strVal val="#ppt_x"/>
+                                          </p:val>
+                                        </p:tav>
+                                        <p:tav tm="100000">
+                                          <p:val>
+                                            <p:strVal val="#ppt_x"/>
+                                          </p:val>
+                                        </p:tav>
+                                      </p:tavLst>
+                                    </p:anim>
+                                    <p:anim calcmode="lin" valueType="num">
+                                      <p:cBhvr additive="base">
+                                        <p:cTn id="31" dur="500" fill="hold"/>
+                                        <p:tgtEl>
+                                          <p:spTgt spid="53"/>
+                                        </p:tgtEl>
+                                        <p:attrNameLst>
+                                          <p:attrName>ppt_y</p:attrName>
+                                        </p:attrNameLst>
+                                      </p:cBhvr>
+                                      <p:tavLst>
+                                        <p:tav tm="0">
+                                          <p:val>
+                                            <p:strVal val="1+#ppt_h/2"/>
+                                          </p:val>
+                                        </p:tav>
+                                        <p:tav tm="100000">
+                                          <p:val>
+                                            <p:strVal val="#ppt_y"/>
+                                          </p:val>
+                                        </p:tav>
+                                      </p:tavLst>
+                                    </p:anim>
+                                  </p:childTnLst>
+                                </p:cTn>
+                              </p:par>
+                              <p:par>
+                                <p:cTn id="32" presetID="2" presetClass="entr" presetSubtype="4" fill="hold" nodeType="withEffect">
+                                  <p:stCondLst>
+                                    <p:cond delay="0"/>
+                                  </p:stCondLst>
+                                  <p:childTnLst>
+                                    <p:set>
+                                      <p:cBhvr>
+                                        <p:cTn id="33" dur="1" fill="hold">
+                                          <p:stCondLst>
+                                            <p:cond delay="0"/>
+                                          </p:stCondLst>
+                                        </p:cTn>
+                                        <p:tgtEl>
+                                          <p:spTgt spid="56"/>
+                                        </p:tgtEl>
+                                        <p:attrNameLst>
+                                          <p:attrName>style.visibility</p:attrName>
+                                        </p:attrNameLst>
+                                      </p:cBhvr>
+                                      <p:to>
+                                        <p:strVal val="visible"/>
+                                      </p:to>
+                                    </p:set>
+                                    <p:anim calcmode="lin" valueType="num">
+                                      <p:cBhvr additive="base">
+                                        <p:cTn id="34" dur="500" fill="hold"/>
+                                        <p:tgtEl>
+                                          <p:spTgt spid="56"/>
+                                        </p:tgtEl>
+                                        <p:attrNameLst>
+                                          <p:attrName>ppt_x</p:attrName>
+                                        </p:attrNameLst>
+                                      </p:cBhvr>
+                                      <p:tavLst>
+                                        <p:tav tm="0">
+                                          <p:val>
+                                            <p:strVal val="#ppt_x"/>
+                                          </p:val>
+                                        </p:tav>
+                                        <p:tav tm="100000">
+                                          <p:val>
+                                            <p:strVal val="#ppt_x"/>
+                                          </p:val>
+                                        </p:tav>
+                                      </p:tavLst>
+                                    </p:anim>
+                                    <p:anim calcmode="lin" valueType="num">
+                                      <p:cBhvr additive="base">
+                                        <p:cTn id="35" dur="500" fill="hold"/>
+                                        <p:tgtEl>
+                                          <p:spTgt spid="56"/>
+                                        </p:tgtEl>
+                                        <p:attrNameLst>
+                                          <p:attrName>ppt_y</p:attrName>
+                                        </p:attrNameLst>
+                                      </p:cBhvr>
+                                      <p:tavLst>
+                                        <p:tav tm="0">
+                                          <p:val>
+                                            <p:strVal val="1+#ppt_h/2"/>
+                                          </p:val>
+                                        </p:tav>
+                                        <p:tav tm="100000">
+                                          <p:val>
+                                            <p:strVal val="#ppt_y"/>
+                                          </p:val>
+                                        </p:tav>
+                                      </p:tavLst>
+                                    </p:anim>
+                                  </p:childTnLst>
+                                </p:cTn>
+                              </p:par>
+                            </p:childTnLst>
+                          </p:cTn>
+                        </p:par>
+                      </p:childTnLst>
+                    </p:cTn>
+                  </p:par>
+                  <p:par>
+                    <p:cTn id="36" fill="hold">
+                      <p:stCondLst>
+                        <p:cond delay="indefinite"/>
+                      </p:stCondLst>
+                      <p:childTnLst>
+                        <p:par>
+                          <p:cTn id="37" fill="hold">
+                            <p:stCondLst>
+                              <p:cond delay="0"/>
+                            </p:stCondLst>
+                            <p:childTnLst>
+                              <p:par>
+                                <p:cTn id="38" presetID="42" presetClass="entr" presetSubtype="0" fill="hold" nodeType="clickEffect">
+                                  <p:stCondLst>
+                                    <p:cond delay="0"/>
+                                  </p:stCondLst>
+                                  <p:childTnLst>
+                                    <p:set>
+                                      <p:cBhvr>
+                                        <p:cTn id="39" dur="1" fill="hold">
+                                          <p:stCondLst>
+                                            <p:cond delay="0"/>
+                                          </p:stCondLst>
+                                        </p:cTn>
+                                        <p:tgtEl>
+                                          <p:spTgt spid="7"/>
+                                        </p:tgtEl>
+                                        <p:attrNameLst>
+                                          <p:attrName>style.visibility</p:attrName>
+                                        </p:attrNameLst>
+                                      </p:cBhvr>
+                                      <p:to>
+                                        <p:strVal val="visible"/>
+                                      </p:to>
+                                    </p:set>
+                                    <p:animEffect transition="in" filter="fade">
+                                      <p:cBhvr>
+                                        <p:cTn id="40" dur="1000"/>
+                                        <p:tgtEl>
+                                          <p:spTgt spid="7"/>
+                                        </p:tgtEl>
+                                      </p:cBhvr>
+                                    </p:animEffect>
+                                    <p:anim calcmode="lin" valueType="num">
+                                      <p:cBhvr>
+                                        <p:cTn id="41" dur="1000" fill="hold"/>
+                                        <p:tgtEl>
+                                          <p:spTgt spid="7"/>
+                                        </p:tgtEl>
+                                        <p:attrNameLst>
+                                          <p:attrName>ppt_x</p:attrName>
+                                        </p:attrNameLst>
+                                      </p:cBhvr>
+                                      <p:tavLst>
+                                        <p:tav tm="0">
+                                          <p:val>
+                                            <p:strVal val="#ppt_x"/>
+                                          </p:val>
+                                        </p:tav>
+                                        <p:tav tm="100000">
+                                          <p:val>
+                                            <p:strVal val="#ppt_x"/>
+                                          </p:val>
+                                        </p:tav>
+                                      </p:tavLst>
+                                    </p:anim>
+                                    <p:anim calcmode="lin" valueType="num">
+                                      <p:cBhvr>
+                                        <p:cTn id="42" dur="1000" fill="hold"/>
+                                        <p:tgtEl>
+                                          <p:spTgt spid="7"/>
+                                        </p:tgtEl>
+                                        <p:attrNameLst>
+                                          <p:attrName>ppt_y</p:attrName>
+                                        </p:attrNameLst>
+                                      </p:cBhvr>
+                                      <p:tavLst>
+                                        <p:tav tm="0">
+                                          <p:val>
+                                            <p:strVal val="#ppt_y+.1"/>
+                                          </p:val>
+                                        </p:tav>
+                                        <p:tav tm="100000">
+                                          <p:val>
+                                            <p:strVal val="#ppt_y"/>
+                                          </p:val>
+                                        </p:tav>
+                                      </p:tavLst>
+                                    </p:anim>
+                                  </p:childTnLst>
+                                </p:cTn>
+                              </p:par>
+                              <p:par>
+                                <p:cTn id="43" presetID="42" presetClass="entr" presetSubtype="0" fill="hold" grpId="0" nodeType="withEffect">
+                                  <p:stCondLst>
+                                    <p:cond delay="0"/>
+                                  </p:stCondLst>
+                                  <p:childTnLst>
+                                    <p:set>
+                                      <p:cBhvr>
+                                        <p:cTn id="44" dur="1" fill="hold">
+                                          <p:stCondLst>
+                                            <p:cond delay="0"/>
+                                          </p:stCondLst>
+                                        </p:cTn>
+                                        <p:tgtEl>
+                                          <p:spTgt spid="8"/>
+                                        </p:tgtEl>
+                                        <p:attrNameLst>
+                                          <p:attrName>style.visibility</p:attrName>
+                                        </p:attrNameLst>
+                                      </p:cBhvr>
+                                      <p:to>
+                                        <p:strVal val="visible"/>
+                                      </p:to>
+                                    </p:set>
+                                    <p:animEffect transition="in" filter="fade">
+                                      <p:cBhvr>
+                                        <p:cTn id="45" dur="1000"/>
+                                        <p:tgtEl>
+                                          <p:spTgt spid="8"/>
+                                        </p:tgtEl>
+                                      </p:cBhvr>
+                                    </p:animEffect>
+                                    <p:anim calcmode="lin" valueType="num">
+                                      <p:cBhvr>
+                                        <p:cTn id="46" dur="1000" fill="hold"/>
+                                        <p:tgtEl>
+                                          <p:spTgt spid="8"/>
+                                        </p:tgtEl>
+                                        <p:attrNameLst>
+                                          <p:attrName>ppt_x</p:attrName>
+                                        </p:attrNameLst>
+                                      </p:cBhvr>
+                                      <p:tavLst>
+                                        <p:tav tm="0">
+                                          <p:val>
+                                            <p:strVal val="#ppt_x"/>
+                                          </p:val>
+                                        </p:tav>
+                                        <p:tav tm="100000">
+                                          <p:val>
+                                            <p:strVal val="#ppt_x"/>
+                                          </p:val>
+                                        </p:tav>
+                                      </p:tavLst>
+                                    </p:anim>
+                                    <p:anim calcmode="lin" valueType="num">
+                                      <p:cBhvr>
+                                        <p:cTn id="47" dur="1000" fill="hold"/>
+                                        <p:tgtEl>
+                                          <p:spTgt spid="8"/>
+                                        </p:tgtEl>
+                                        <p:attrNameLst>
+                                          <p:attrName>ppt_y</p:attrName>
+                                        </p:attrNameLst>
+                                      </p:cBhvr>
+                                      <p:tavLst>
+                                        <p:tav tm="0">
+                                          <p:val>
+                                            <p:strVal val="#ppt_y+.1"/>
+                                          </p:val>
+                                        </p:tav>
+                                        <p:tav tm="100000">
+                                          <p:val>
+                                            <p:strVal val="#ppt_y"/>
+                                          </p:val>
+                                        </p:tav>
+                                      </p:tavLst>
+                                    </p:anim>
+                                  </p:childTnLst>
+                                </p:cTn>
+                              </p:par>
+                              <p:par>
+                                <p:cTn id="48" presetID="42" presetClass="entr" presetSubtype="0" fill="hold" grpId="0" nodeType="withEffect">
+                                  <p:stCondLst>
+                                    <p:cond delay="0"/>
+                                  </p:stCondLst>
+                                  <p:childTnLst>
+                                    <p:set>
+                                      <p:cBhvr>
+                                        <p:cTn id="49" dur="1" fill="hold">
+                                          <p:stCondLst>
+                                            <p:cond delay="0"/>
+                                          </p:stCondLst>
+                                        </p:cTn>
+                                        <p:tgtEl>
+                                          <p:spTgt spid="9"/>
+                                        </p:tgtEl>
+                                        <p:attrNameLst>
+                                          <p:attrName>style.visibility</p:attrName>
+                                        </p:attrNameLst>
+                                      </p:cBhvr>
+                                      <p:to>
+                                        <p:strVal val="visible"/>
+                                      </p:to>
+                                    </p:set>
+                                    <p:animEffect transition="in" filter="fade">
+                                      <p:cBhvr>
+                                        <p:cTn id="50" dur="1000"/>
+                                        <p:tgtEl>
+                                          <p:spTgt spid="9"/>
+                                        </p:tgtEl>
+                                      </p:cBhvr>
+                                    </p:animEffect>
+                                    <p:anim calcmode="lin" valueType="num">
+                                      <p:cBhvr>
+                                        <p:cTn id="51" dur="1000" fill="hold"/>
+                                        <p:tgtEl>
+                                          <p:spTgt spid="9"/>
+                                        </p:tgtEl>
+                                        <p:attrNameLst>
+                                          <p:attrName>ppt_x</p:attrName>
+                                        </p:attrNameLst>
+                                      </p:cBhvr>
+                                      <p:tavLst>
+                                        <p:tav tm="0">
+                                          <p:val>
+                                            <p:strVal val="#ppt_x"/>
+                                          </p:val>
+                                        </p:tav>
+                                        <p:tav tm="100000">
+                                          <p:val>
+                                            <p:strVal val="#ppt_x"/>
+                                          </p:val>
+                                        </p:tav>
+                                      </p:tavLst>
+                                    </p:anim>
+                                    <p:anim calcmode="lin" valueType="num">
+                                      <p:cBhvr>
+                                        <p:cTn id="52" dur="1000" fill="hold"/>
+                                        <p:tgtEl>
+                                          <p:spTgt spid="9"/>
+                                        </p:tgtEl>
+                                        <p:attrNameLst>
+                                          <p:attrName>ppt_y</p:attrName>
+                                        </p:attrNameLst>
+                                      </p:cBhvr>
+                                      <p:tavLst>
+                                        <p:tav tm="0">
+                                          <p:val>
+                                            <p:strVal val="#ppt_y+.1"/>
+                                          </p:val>
+                                        </p:tav>
+                                        <p:tav tm="100000">
+                                          <p:val>
+                                            <p:strVal val="#ppt_y"/>
+                                          </p:val>
+                                        </p:tav>
+                                      </p:tavLst>
+                                    </p:anim>
+                                  </p:childTnLst>
+                                </p:cTn>
+                              </p:par>
+                              <p:par>
+                                <p:cTn id="53" presetID="42" presetClass="entr" presetSubtype="0" fill="hold" grpId="0" nodeType="withEffect">
+                                  <p:stCondLst>
+                                    <p:cond delay="0"/>
+                                  </p:stCondLst>
+                                  <p:childTnLst>
+                                    <p:set>
+                                      <p:cBhvr>
+                                        <p:cTn id="54" dur="1" fill="hold">
+                                          <p:stCondLst>
+                                            <p:cond delay="0"/>
+                                          </p:stCondLst>
+                                        </p:cTn>
+                                        <p:tgtEl>
+                                          <p:spTgt spid="10"/>
+                                        </p:tgtEl>
+                                        <p:attrNameLst>
+                                          <p:attrName>style.visibility</p:attrName>
+                                        </p:attrNameLst>
+                                      </p:cBhvr>
+                                      <p:to>
+                                        <p:strVal val="visible"/>
+                                      </p:to>
+                                    </p:set>
+                                    <p:animEffect transition="in" filter="fade">
+                                      <p:cBhvr>
+                                        <p:cTn id="55" dur="1000"/>
+                                        <p:tgtEl>
+                                          <p:spTgt spid="10"/>
+                                        </p:tgtEl>
+                                      </p:cBhvr>
+                                    </p:animEffect>
+                                    <p:anim calcmode="lin" valueType="num">
+                                      <p:cBhvr>
+                                        <p:cTn id="56" dur="1000" fill="hold"/>
+                                        <p:tgtEl>
+                                          <p:spTgt spid="10"/>
+                                        </p:tgtEl>
+                                        <p:attrNameLst>
+                                          <p:attrName>ppt_x</p:attrName>
+                                        </p:attrNameLst>
+                                      </p:cBhvr>
+                                      <p:tavLst>
+                                        <p:tav tm="0">
+                                          <p:val>
+                                            <p:strVal val="#ppt_x"/>
+                                          </p:val>
+                                        </p:tav>
+                                        <p:tav tm="100000">
+                                          <p:val>
+                                            <p:strVal val="#ppt_x"/>
+                                          </p:val>
+                                        </p:tav>
+                                      </p:tavLst>
+                                    </p:anim>
+                                    <p:anim calcmode="lin" valueType="num">
+                                      <p:cBhvr>
+                                        <p:cTn id="57" dur="1000" fill="hold"/>
+                                        <p:tgtEl>
+                                          <p:spTgt spid="10"/>
+                                        </p:tgtEl>
+                                        <p:attrNameLst>
+                                          <p:attrName>ppt_y</p:attrName>
+                                        </p:attrNameLst>
+                                      </p:cBhvr>
+                                      <p:tavLst>
+                                        <p:tav tm="0">
+                                          <p:val>
+                                            <p:strVal val="#ppt_y+.1"/>
+                                          </p:val>
+                                        </p:tav>
+                                        <p:tav tm="100000">
+                                          <p:val>
+                                            <p:strVal val="#ppt_y"/>
+                                          </p:val>
+                                        </p:tav>
+                                      </p:tavLst>
+                                    </p:anim>
+                                  </p:childTnLst>
+                                </p:cTn>
+                              </p:par>
+                              <p:par>
+                                <p:cTn id="58" presetID="42" presetClass="entr" presetSubtype="0" fill="hold" nodeType="withEffect">
+                                  <p:stCondLst>
+                                    <p:cond delay="0"/>
+                                  </p:stCondLst>
+                                  <p:childTnLst>
+                                    <p:set>
+                                      <p:cBhvr>
+                                        <p:cTn id="59" dur="1" fill="hold">
+                                          <p:stCondLst>
+                                            <p:cond delay="0"/>
+                                          </p:stCondLst>
+                                        </p:cTn>
+                                        <p:tgtEl>
+                                          <p:spTgt spid="13"/>
+                                        </p:tgtEl>
+                                        <p:attrNameLst>
+                                          <p:attrName>style.visibility</p:attrName>
+                                        </p:attrNameLst>
+                                      </p:cBhvr>
+                                      <p:to>
+                                        <p:strVal val="visible"/>
+                                      </p:to>
+                                    </p:set>
+                                    <p:animEffect transition="in" filter="fade">
+                                      <p:cBhvr>
+                                        <p:cTn id="60" dur="1000"/>
+                                        <p:tgtEl>
+                                          <p:spTgt spid="13"/>
+                                        </p:tgtEl>
+                                      </p:cBhvr>
+                                    </p:animEffect>
+                                    <p:anim calcmode="lin" valueType="num">
+                                      <p:cBhvr>
+                                        <p:cTn id="61" dur="1000" fill="hold"/>
+                                        <p:tgtEl>
+                                          <p:spTgt spid="13"/>
+                                        </p:tgtEl>
+                                        <p:attrNameLst>
+                                          <p:attrName>ppt_x</p:attrName>
+                                        </p:attrNameLst>
+                                      </p:cBhvr>
+                                      <p:tavLst>
+                                        <p:tav tm="0">
+                                          <p:val>
+                                            <p:strVal val="#ppt_x"/>
+                                          </p:val>
+                                        </p:tav>
+                                        <p:tav tm="100000">
+                                          <p:val>
+                                            <p:strVal val="#ppt_x"/>
+                                          </p:val>
+                                        </p:tav>
+                                      </p:tavLst>
+                                    </p:anim>
+                                    <p:anim calcmode="lin" valueType="num">
+                                      <p:cBhvr>
+                                        <p:cTn id="62" dur="1000" fill="hold"/>
+                                        <p:tgtEl>
+                                          <p:spTgt spid="13"/>
+                                        </p:tgtEl>
+                                        <p:attrNameLst>
+                                          <p:attrName>ppt_y</p:attrName>
+                                        </p:attrNameLst>
+                                      </p:cBhvr>
+                                      <p:tavLst>
+                                        <p:tav tm="0">
+                                          <p:val>
+                                            <p:strVal val="#ppt_y+.1"/>
+                                          </p:val>
+                                        </p:tav>
+                                        <p:tav tm="100000">
+                                          <p:val>
+                                            <p:strVal val="#ppt_y"/>
+                                          </p:val>
+                                        </p:tav>
+                                      </p:tavLst>
+                                    </p:anim>
+                                  </p:childTnLst>
+                                </p:cTn>
+                              </p:par>
+                              <p:par>
+                                <p:cTn id="63" presetID="42" presetClass="entr" presetSubtype="0" fill="hold" nodeType="withEffect">
+                                  <p:stCondLst>
+                                    <p:cond delay="0"/>
+                                  </p:stCondLst>
+                                  <p:childTnLst>
+                                    <p:set>
+                                      <p:cBhvr>
+                                        <p:cTn id="64" dur="1" fill="hold">
+                                          <p:stCondLst>
+                                            <p:cond delay="0"/>
+                                          </p:stCondLst>
+                                        </p:cTn>
+                                        <p:tgtEl>
+                                          <p:spTgt spid="15"/>
+                                        </p:tgtEl>
+                                        <p:attrNameLst>
+                                          <p:attrName>style.visibility</p:attrName>
+                                        </p:attrNameLst>
+                                      </p:cBhvr>
+                                      <p:to>
+                                        <p:strVal val="visible"/>
+                                      </p:to>
+                                    </p:set>
+                                    <p:animEffect transition="in" filter="fade">
+                                      <p:cBhvr>
+                                        <p:cTn id="65" dur="1000"/>
+                                        <p:tgtEl>
+                                          <p:spTgt spid="15"/>
+                                        </p:tgtEl>
+                                      </p:cBhvr>
+                                    </p:animEffect>
+                                    <p:anim calcmode="lin" valueType="num">
+                                      <p:cBhvr>
+                                        <p:cTn id="66" dur="1000" fill="hold"/>
+                                        <p:tgtEl>
+                                          <p:spTgt spid="15"/>
+                                        </p:tgtEl>
+                                        <p:attrNameLst>
+                                          <p:attrName>ppt_x</p:attrName>
+                                        </p:attrNameLst>
+                                      </p:cBhvr>
+                                      <p:tavLst>
+                                        <p:tav tm="0">
+                                          <p:val>
+                                            <p:strVal val="#ppt_x"/>
+                                          </p:val>
+                                        </p:tav>
+                                        <p:tav tm="100000">
+                                          <p:val>
+                                            <p:strVal val="#ppt_x"/>
+                                          </p:val>
+                                        </p:tav>
+                                      </p:tavLst>
+                                    </p:anim>
+                                    <p:anim calcmode="lin" valueType="num">
+                                      <p:cBhvr>
+                                        <p:cTn id="67" dur="1000" fill="hold"/>
+                                        <p:tgtEl>
+                                          <p:spTgt spid="15"/>
+                                        </p:tgtEl>
+                                        <p:attrNameLst>
+                                          <p:attrName>ppt_y</p:attrName>
+                                        </p:attrNameLst>
+                                      </p:cBhvr>
+                                      <p:tavLst>
+                                        <p:tav tm="0">
+                                          <p:val>
+                                            <p:strVal val="#ppt_y+.1"/>
+                                          </p:val>
+                                        </p:tav>
+                                        <p:tav tm="100000">
+                                          <p:val>
+                                            <p:strVal val="#ppt_y"/>
+                                          </p:val>
+                                        </p:tav>
+                                      </p:tavLst>
+                                    </p:anim>
+                                  </p:childTnLst>
+                                </p:cTn>
+                              </p:par>
+                              <p:par>
+                                <p:cTn id="68" presetID="42" presetClass="entr" presetSubtype="0" fill="hold" grpId="0" nodeType="withEffect">
+                                  <p:stCondLst>
+                                    <p:cond delay="0"/>
+                                  </p:stCondLst>
+                                  <p:childTnLst>
+                                    <p:set>
+                                      <p:cBhvr>
+                                        <p:cTn id="69" dur="1" fill="hold">
+                                          <p:stCondLst>
+                                            <p:cond delay="0"/>
+                                          </p:stCondLst>
+                                        </p:cTn>
+                                        <p:tgtEl>
+                                          <p:spTgt spid="17"/>
+                                        </p:tgtEl>
+                                        <p:attrNameLst>
+                                          <p:attrName>style.visibility</p:attrName>
+                                        </p:attrNameLst>
+                                      </p:cBhvr>
+                                      <p:to>
+                                        <p:strVal val="visible"/>
+                                      </p:to>
+                                    </p:set>
+                                    <p:animEffect transition="in" filter="fade">
+                                      <p:cBhvr>
+                                        <p:cTn id="70" dur="1000"/>
+                                        <p:tgtEl>
+                                          <p:spTgt spid="17"/>
+                                        </p:tgtEl>
+                                      </p:cBhvr>
+                                    </p:animEffect>
+                                    <p:anim calcmode="lin" valueType="num">
+                                      <p:cBhvr>
+                                        <p:cTn id="71" dur="1000" fill="hold"/>
+                                        <p:tgtEl>
+                                          <p:spTgt spid="17"/>
+                                        </p:tgtEl>
+                                        <p:attrNameLst>
+                                          <p:attrName>ppt_x</p:attrName>
+                                        </p:attrNameLst>
+                                      </p:cBhvr>
+                                      <p:tavLst>
+                                        <p:tav tm="0">
+                                          <p:val>
+                                            <p:strVal val="#ppt_x"/>
+                                          </p:val>
+                                        </p:tav>
+                                        <p:tav tm="100000">
+                                          <p:val>
+                                            <p:strVal val="#ppt_x"/>
+                                          </p:val>
+                                        </p:tav>
+                                      </p:tavLst>
+                                    </p:anim>
+                                    <p:anim calcmode="lin" valueType="num">
+                                      <p:cBhvr>
+                                        <p:cTn id="72" dur="1000" fill="hold"/>
+                                        <p:tgtEl>
+                                          <p:spTgt spid="17"/>
+                                        </p:tgtEl>
+                                        <p:attrNameLst>
+                                          <p:attrName>ppt_y</p:attrName>
+                                        </p:attrNameLst>
+                                      </p:cBhvr>
+                                      <p:tavLst>
+                                        <p:tav tm="0">
+                                          <p:val>
+                                            <p:strVal val="#ppt_y+.1"/>
+                                          </p:val>
+                                        </p:tav>
+                                        <p:tav tm="100000">
+                                          <p:val>
+                                            <p:strVal val="#ppt_y"/>
+                                          </p:val>
+                                        </p:tav>
+                                      </p:tavLst>
+                                    </p:anim>
+                                  </p:childTnLst>
+                                </p:cTn>
+                              </p:par>
+                              <p:par>
+                                <p:cTn id="73" presetID="42" presetClass="entr" presetSubtype="0" fill="hold" nodeType="withEffect">
+                                  <p:stCondLst>
+                                    <p:cond delay="0"/>
+                                  </p:stCondLst>
+                                  <p:childTnLst>
+                                    <p:set>
+                                      <p:cBhvr>
+                                        <p:cTn id="74" dur="1" fill="hold">
+                                          <p:stCondLst>
+                                            <p:cond delay="0"/>
+                                          </p:stCondLst>
+                                        </p:cTn>
+                                        <p:tgtEl>
+                                          <p:spTgt spid="28"/>
+                                        </p:tgtEl>
+                                        <p:attrNameLst>
+                                          <p:attrName>style.visibility</p:attrName>
+                                        </p:attrNameLst>
+                                      </p:cBhvr>
+                                      <p:to>
+                                        <p:strVal val="visible"/>
+                                      </p:to>
+                                    </p:set>
+                                    <p:animEffect transition="in" filter="fade">
+                                      <p:cBhvr>
+                                        <p:cTn id="75" dur="1000"/>
+                                        <p:tgtEl>
+                                          <p:spTgt spid="28"/>
+                                        </p:tgtEl>
+                                      </p:cBhvr>
+                                    </p:animEffect>
+                                    <p:anim calcmode="lin" valueType="num">
+                                      <p:cBhvr>
+                                        <p:cTn id="76" dur="1000" fill="hold"/>
+                                        <p:tgtEl>
+                                          <p:spTgt spid="28"/>
+                                        </p:tgtEl>
+                                        <p:attrNameLst>
+                                          <p:attrName>ppt_x</p:attrName>
+                                        </p:attrNameLst>
+                                      </p:cBhvr>
+                                      <p:tavLst>
+                                        <p:tav tm="0">
+                                          <p:val>
+                                            <p:strVal val="#ppt_x"/>
+                                          </p:val>
+                                        </p:tav>
+                                        <p:tav tm="100000">
+                                          <p:val>
+                                            <p:strVal val="#ppt_x"/>
+                                          </p:val>
+                                        </p:tav>
+                                      </p:tavLst>
+                                    </p:anim>
+                                    <p:anim calcmode="lin" valueType="num">
+                                      <p:cBhvr>
+                                        <p:cTn id="77" dur="1000" fill="hold"/>
+                                        <p:tgtEl>
+                                          <p:spTgt spid="28"/>
+                                        </p:tgtEl>
+                                        <p:attrNameLst>
+                                          <p:attrName>ppt_y</p:attrName>
+                                        </p:attrNameLst>
+                                      </p:cBhvr>
+                                      <p:tavLst>
+                                        <p:tav tm="0">
+                                          <p:val>
+                                            <p:strVal val="#ppt_y+.1"/>
+                                          </p:val>
+                                        </p:tav>
+                                        <p:tav tm="100000">
+                                          <p:val>
+                                            <p:strVal val="#ppt_y"/>
+                                          </p:val>
+                                        </p:tav>
+                                      </p:tavLst>
+                                    </p:anim>
+                                  </p:childTnLst>
+                                </p:cTn>
+                              </p:par>
+                              <p:par>
+                                <p:cTn id="78" presetID="42" presetClass="entr" presetSubtype="0" fill="hold" grpId="0" nodeType="withEffect">
+                                  <p:stCondLst>
+                                    <p:cond delay="0"/>
+                                  </p:stCondLst>
+                                  <p:childTnLst>
+                                    <p:set>
+                                      <p:cBhvr>
+                                        <p:cTn id="79" dur="1" fill="hold">
+                                          <p:stCondLst>
+                                            <p:cond delay="0"/>
+                                          </p:stCondLst>
+                                        </p:cTn>
+                                        <p:tgtEl>
+                                          <p:spTgt spid="34"/>
+                                        </p:tgtEl>
+                                        <p:attrNameLst>
+                                          <p:attrName>style.visibility</p:attrName>
+                                        </p:attrNameLst>
+                                      </p:cBhvr>
+                                      <p:to>
+                                        <p:strVal val="visible"/>
+                                      </p:to>
+                                    </p:set>
+                                    <p:animEffect transition="in" filter="fade">
+                                      <p:cBhvr>
+                                        <p:cTn id="80" dur="1000"/>
+                                        <p:tgtEl>
+                                          <p:spTgt spid="34"/>
+                                        </p:tgtEl>
+                                      </p:cBhvr>
+                                    </p:animEffect>
+                                    <p:anim calcmode="lin" valueType="num">
+                                      <p:cBhvr>
+                                        <p:cTn id="81" dur="1000" fill="hold"/>
+                                        <p:tgtEl>
+                                          <p:spTgt spid="34"/>
+                                        </p:tgtEl>
+                                        <p:attrNameLst>
+                                          <p:attrName>ppt_x</p:attrName>
+                                        </p:attrNameLst>
+                                      </p:cBhvr>
+                                      <p:tavLst>
+                                        <p:tav tm="0">
+                                          <p:val>
+                                            <p:strVal val="#ppt_x"/>
+                                          </p:val>
+                                        </p:tav>
+                                        <p:tav tm="100000">
+                                          <p:val>
+                                            <p:strVal val="#ppt_x"/>
+                                          </p:val>
+                                        </p:tav>
+                                      </p:tavLst>
+                                    </p:anim>
+                                    <p:anim calcmode="lin" valueType="num">
+                                      <p:cBhvr>
+                                        <p:cTn id="82" dur="1000" fill="hold"/>
+                                        <p:tgtEl>
+                                          <p:spTgt spid="34"/>
+                                        </p:tgtEl>
+                                        <p:attrNameLst>
+                                          <p:attrName>ppt_y</p:attrName>
+                                        </p:attrNameLst>
+                                      </p:cBhvr>
+                                      <p:tavLst>
+                                        <p:tav tm="0">
+                                          <p:val>
+                                            <p:strVal val="#ppt_y+.1"/>
+                                          </p:val>
+                                        </p:tav>
+                                        <p:tav tm="100000">
+                                          <p:val>
+                                            <p:strVal val="#ppt_y"/>
+                                          </p:val>
+                                        </p:tav>
+                                      </p:tavLst>
+                                    </p:anim>
+                                  </p:childTnLst>
+                                </p:cTn>
+                              </p:par>
+                              <p:par>
+                                <p:cTn id="83" presetID="42" presetClass="entr" presetSubtype="0" fill="hold" grpId="0" nodeType="withEffect">
+                                  <p:stCondLst>
+                                    <p:cond delay="0"/>
+                                  </p:stCondLst>
+                                  <p:childTnLst>
+                                    <p:set>
+                                      <p:cBhvr>
+                                        <p:cTn id="84" dur="1" fill="hold">
+                                          <p:stCondLst>
+                                            <p:cond delay="0"/>
+                                          </p:stCondLst>
+                                        </p:cTn>
+                                        <p:tgtEl>
+                                          <p:spTgt spid="42"/>
+                                        </p:tgtEl>
+                                        <p:attrNameLst>
+                                          <p:attrName>style.visibility</p:attrName>
+                                        </p:attrNameLst>
+                                      </p:cBhvr>
+                                      <p:to>
+                                        <p:strVal val="visible"/>
+                                      </p:to>
+                                    </p:set>
+                                    <p:animEffect transition="in" filter="fade">
+                                      <p:cBhvr>
+                                        <p:cTn id="85" dur="1000"/>
+                                        <p:tgtEl>
+                                          <p:spTgt spid="42"/>
+                                        </p:tgtEl>
+                                      </p:cBhvr>
+                                    </p:animEffect>
+                                    <p:anim calcmode="lin" valueType="num">
+                                      <p:cBhvr>
+                                        <p:cTn id="86" dur="1000" fill="hold"/>
+                                        <p:tgtEl>
+                                          <p:spTgt spid="42"/>
+                                        </p:tgtEl>
+                                        <p:attrNameLst>
+                                          <p:attrName>ppt_x</p:attrName>
+                                        </p:attrNameLst>
+                                      </p:cBhvr>
+                                      <p:tavLst>
+                                        <p:tav tm="0">
+                                          <p:val>
+                                            <p:strVal val="#ppt_x"/>
+                                          </p:val>
+                                        </p:tav>
+                                        <p:tav tm="100000">
+                                          <p:val>
+                                            <p:strVal val="#ppt_x"/>
+                                          </p:val>
+                                        </p:tav>
+                                      </p:tavLst>
+                                    </p:anim>
+                                    <p:anim calcmode="lin" valueType="num">
+                                      <p:cBhvr>
+                                        <p:cTn id="87" dur="1000" fill="hold"/>
+                                        <p:tgtEl>
+                                          <p:spTgt spid="42"/>
+                                        </p:tgtEl>
+                                        <p:attrNameLst>
+                                          <p:attrName>ppt_y</p:attrName>
+                                        </p:attrNameLst>
+                                      </p:cBhvr>
+                                      <p:tavLst>
+                                        <p:tav tm="0">
+                                          <p:val>
+                                            <p:strVal val="#ppt_y+.1"/>
+                                          </p:val>
+                                        </p:tav>
+                                        <p:tav tm="100000">
+                                          <p:val>
+                                            <p:strVal val="#ppt_y"/>
+                                          </p:val>
+                                        </p:tav>
+                                      </p:tavLst>
+                                    </p:anim>
+                                  </p:childTnLst>
+                                </p:cTn>
+                              </p:par>
+                              <p:par>
+                                <p:cTn id="88" presetID="42" presetClass="entr" presetSubtype="0" fill="hold" grpId="0" nodeType="withEffect">
+                                  <p:stCondLst>
+                                    <p:cond delay="0"/>
+                                  </p:stCondLst>
+                                  <p:childTnLst>
+                                    <p:set>
+                                      <p:cBhvr>
+                                        <p:cTn id="89" dur="1" fill="hold">
+                                          <p:stCondLst>
+                                            <p:cond delay="0"/>
+                                          </p:stCondLst>
+                                        </p:cTn>
+                                        <p:tgtEl>
+                                          <p:spTgt spid="71"/>
+                                        </p:tgtEl>
+                                        <p:attrNameLst>
+                                          <p:attrName>style.visibility</p:attrName>
+                                        </p:attrNameLst>
+                                      </p:cBhvr>
+                                      <p:to>
+                                        <p:strVal val="visible"/>
+                                      </p:to>
+                                    </p:set>
+                                    <p:animEffect transition="in" filter="fade">
+                                      <p:cBhvr>
+                                        <p:cTn id="90" dur="1000"/>
+                                        <p:tgtEl>
+                                          <p:spTgt spid="71"/>
+                                        </p:tgtEl>
+                                      </p:cBhvr>
+                                    </p:animEffect>
+                                    <p:anim calcmode="lin" valueType="num">
+                                      <p:cBhvr>
+                                        <p:cTn id="91" dur="1000" fill="hold"/>
+                                        <p:tgtEl>
+                                          <p:spTgt spid="71"/>
+                                        </p:tgtEl>
+                                        <p:attrNameLst>
+                                          <p:attrName>ppt_x</p:attrName>
+                                        </p:attrNameLst>
+                                      </p:cBhvr>
+                                      <p:tavLst>
+                                        <p:tav tm="0">
+                                          <p:val>
+                                            <p:strVal val="#ppt_x"/>
+                                          </p:val>
+                                        </p:tav>
+                                        <p:tav tm="100000">
+                                          <p:val>
+                                            <p:strVal val="#ppt_x"/>
+                                          </p:val>
+                                        </p:tav>
+                                      </p:tavLst>
+                                    </p:anim>
+                                    <p:anim calcmode="lin" valueType="num">
+                                      <p:cBhvr>
+                                        <p:cTn id="92" dur="1000" fill="hold"/>
+                                        <p:tgtEl>
+                                          <p:spTgt spid="71"/>
+                                        </p:tgtEl>
+                                        <p:attrNameLst>
+                                          <p:attrName>ppt_y</p:attrName>
+                                        </p:attrNameLst>
+                                      </p:cBhvr>
+                                      <p:tavLst>
+                                        <p:tav tm="0">
+                                          <p:val>
+                                            <p:strVal val="#ppt_y+.1"/>
+                                          </p:val>
+                                        </p:tav>
+                                        <p:tav tm="100000">
+                                          <p:val>
+                                            <p:strVal val="#ppt_y"/>
+                                          </p:val>
+                                        </p:tav>
+                                      </p:tavLst>
+                                    </p:anim>
+                                  </p:childTnLst>
+                                </p:cTn>
+                              </p:par>
+                            </p:childTnLst>
+                          </p:cTn>
+                        </p:par>
+                      </p:childTnLst>
+                    </p:cTn>
+                  </p:par>
+                  <p:par>
+                    <p:cTn id="93" fill="hold">
+                      <p:stCondLst>
+                        <p:cond delay="indefinite"/>
+                      </p:stCondLst>
+                      <p:childTnLst>
+                        <p:par>
+                          <p:cTn id="94" fill="hold">
+                            <p:stCondLst>
+                              <p:cond delay="0"/>
+                            </p:stCondLst>
+                            <p:childTnLst>
+                              <p:par>
+                                <p:cTn id="95" presetID="42" presetClass="entr" presetSubtype="0" fill="hold" grpId="0" nodeType="clickEffect">
+                                  <p:stCondLst>
+                                    <p:cond delay="0"/>
+                                  </p:stCondLst>
+                                  <p:childTnLst>
+                                    <p:set>
+                                      <p:cBhvr>
+                                        <p:cTn id="96" dur="1" fill="hold">
+                                          <p:stCondLst>
+                                            <p:cond delay="0"/>
+                                          </p:stCondLst>
+                                        </p:cTn>
+                                        <p:tgtEl>
+                                          <p:spTgt spid="11"/>
+                                        </p:tgtEl>
+                                        <p:attrNameLst>
+                                          <p:attrName>style.visibility</p:attrName>
+                                        </p:attrNameLst>
+                                      </p:cBhvr>
+                                      <p:to>
+                                        <p:strVal val="visible"/>
+                                      </p:to>
+                                    </p:set>
+                                    <p:animEffect transition="in" filter="fade">
+                                      <p:cBhvr>
+                                        <p:cTn id="97" dur="1000"/>
+                                        <p:tgtEl>
+                                          <p:spTgt spid="11"/>
+                                        </p:tgtEl>
+                                      </p:cBhvr>
+                                    </p:animEffect>
+                                    <p:anim calcmode="lin" valueType="num">
+                                      <p:cBhvr>
+                                        <p:cTn id="98" dur="1000" fill="hold"/>
+                                        <p:tgtEl>
+                                          <p:spTgt spid="11"/>
+                                        </p:tgtEl>
+                                        <p:attrNameLst>
+                                          <p:attrName>ppt_x</p:attrName>
+                                        </p:attrNameLst>
+                                      </p:cBhvr>
+                                      <p:tavLst>
+                                        <p:tav tm="0">
+                                          <p:val>
+                                            <p:strVal val="#ppt_x"/>
+                                          </p:val>
+                                        </p:tav>
+                                        <p:tav tm="100000">
+                                          <p:val>
+                                            <p:strVal val="#ppt_x"/>
+                                          </p:val>
+                                        </p:tav>
+                                      </p:tavLst>
+                                    </p:anim>
+                                    <p:anim calcmode="lin" valueType="num">
+                                      <p:cBhvr>
+                                        <p:cTn id="99" dur="1000" fill="hold"/>
+                                        <p:tgtEl>
+                                          <p:spTgt spid="11"/>
+                                        </p:tgtEl>
+                                        <p:attrNameLst>
+                                          <p:attrName>ppt_y</p:attrName>
+                                        </p:attrNameLst>
+                                      </p:cBhvr>
+                                      <p:tavLst>
+                                        <p:tav tm="0">
+                                          <p:val>
+                                            <p:strVal val="#ppt_y+.1"/>
+                                          </p:val>
+                                        </p:tav>
+                                        <p:tav tm="100000">
+                                          <p:val>
+                                            <p:strVal val="#ppt_y"/>
+                                          </p:val>
+                                        </p:tav>
+                                      </p:tavLst>
+                                    </p:anim>
+                                  </p:childTnLst>
+                                </p:cTn>
+                              </p:par>
+                            </p:childTnLst>
+                          </p:cTn>
+                        </p:par>
+                      </p:childTnLst>
+                    </p:cTn>
+                  </p:par>
+                  <p:par>
+                    <p:cTn id="100" fill="hold">
+                      <p:stCondLst>
+                        <p:cond delay="indefinite"/>
+                      </p:stCondLst>
+                      <p:childTnLst>
+                        <p:par>
+                          <p:cTn id="101" fill="hold">
+                            <p:stCondLst>
+                              <p:cond delay="0"/>
+                            </p:stCondLst>
+                            <p:childTnLst>
+                              <p:par>
+                                <p:cTn id="102" presetID="16" presetClass="entr" presetSubtype="21" fill="hold" grpId="0" nodeType="clickEffect">
+                                  <p:stCondLst>
+                                    <p:cond delay="0"/>
+                                  </p:stCondLst>
+                                  <p:childTnLst>
+                                    <p:set>
+                                      <p:cBhvr>
+                                        <p:cTn id="103" dur="1" fill="hold">
+                                          <p:stCondLst>
+                                            <p:cond delay="0"/>
+                                          </p:stCondLst>
+                                        </p:cTn>
+                                        <p:tgtEl>
+                                          <p:spTgt spid="33"/>
+                                        </p:tgtEl>
+                                        <p:attrNameLst>
+                                          <p:attrName>style.visibility</p:attrName>
+                                        </p:attrNameLst>
+                                      </p:cBhvr>
+                                      <p:to>
+                                        <p:strVal val="visible"/>
+                                      </p:to>
+                                    </p:set>
+                                    <p:animEffect transition="in" filter="barn(inVertical)">
+                                      <p:cBhvr>
+                                        <p:cTn id="104" dur="500"/>
+                                        <p:tgtEl>
+                                          <p:spTgt spid="33"/>
+                                        </p:tgtEl>
+                                      </p:cBhvr>
+                                    </p:animEffect>
+                                  </p:childTnLst>
+                                </p:cTn>
+                              </p:par>
+                            </p:childTnLst>
+                          </p:cTn>
+                        </p:par>
+                      </p:childTnLst>
+                    </p:cTn>
+                  </p:par>
+                  <p:par>
+                    <p:cTn id="105" fill="hold">
+                      <p:stCondLst>
+                        <p:cond delay="indefinite"/>
+                      </p:stCondLst>
+                      <p:childTnLst>
+                        <p:par>
+                          <p:cTn id="106" fill="hold">
+                            <p:stCondLst>
+                              <p:cond delay="0"/>
+                            </p:stCondLst>
+                            <p:childTnLst>
+                              <p:par>
+                                <p:cTn id="107" presetID="42" presetClass="entr" presetSubtype="0" fill="hold" grpId="0" nodeType="clickEffect">
+                                  <p:stCondLst>
+                                    <p:cond delay="0"/>
+                                  </p:stCondLst>
+                                  <p:childTnLst>
+                                    <p:set>
+                                      <p:cBhvr>
+                                        <p:cTn id="108" dur="1" fill="hold">
+                                          <p:stCondLst>
+                                            <p:cond delay="0"/>
+                                          </p:stCondLst>
+                                        </p:cTn>
+                                        <p:tgtEl>
+                                          <p:spTgt spid="37"/>
+                                        </p:tgtEl>
+                                        <p:attrNameLst>
+                                          <p:attrName>style.visibility</p:attrName>
+                                        </p:attrNameLst>
+                                      </p:cBhvr>
+                                      <p:to>
+                                        <p:strVal val="visible"/>
+                                      </p:to>
+                                    </p:set>
+                                    <p:animEffect transition="in" filter="fade">
+                                      <p:cBhvr>
+                                        <p:cTn id="109" dur="1000"/>
+                                        <p:tgtEl>
+                                          <p:spTgt spid="37"/>
+                                        </p:tgtEl>
+                                      </p:cBhvr>
+                                    </p:animEffect>
+                                    <p:anim calcmode="lin" valueType="num">
+                                      <p:cBhvr>
+                                        <p:cTn id="110" dur="1000" fill="hold"/>
+                                        <p:tgtEl>
+                                          <p:spTgt spid="37"/>
+                                        </p:tgtEl>
+                                        <p:attrNameLst>
+                                          <p:attrName>ppt_x</p:attrName>
+                                        </p:attrNameLst>
+                                      </p:cBhvr>
+                                      <p:tavLst>
+                                        <p:tav tm="0">
+                                          <p:val>
+                                            <p:strVal val="#ppt_x"/>
+                                          </p:val>
+                                        </p:tav>
+                                        <p:tav tm="100000">
+                                          <p:val>
+                                            <p:strVal val="#ppt_x"/>
+                                          </p:val>
+                                        </p:tav>
+                                      </p:tavLst>
+                                    </p:anim>
+                                    <p:anim calcmode="lin" valueType="num">
+                                      <p:cBhvr>
+                                        <p:cTn id="111" dur="1000" fill="hold"/>
+                                        <p:tgtEl>
+                                          <p:spTgt spid="37"/>
+                                        </p:tgtEl>
+                                        <p:attrNameLst>
+                                          <p:attrName>ppt_y</p:attrName>
+                                        </p:attrNameLst>
+                                      </p:cBhvr>
+                                      <p:tavLst>
+                                        <p:tav tm="0">
+                                          <p:val>
+                                            <p:strVal val="#ppt_y+.1"/>
+                                          </p:val>
+                                        </p:tav>
+                                        <p:tav tm="100000">
+                                          <p:val>
+                                            <p:strVal val="#ppt_y"/>
+                                          </p:val>
+                                        </p:tav>
+                                      </p:tavLst>
+                                    </p:anim>
+                                  </p:childTnLst>
+                                </p:cTn>
+                              </p:par>
+                            </p:childTnLst>
+                          </p:cTn>
+                        </p:par>
+                      </p:childTnLst>
+                    </p:cTn>
+                  </p:par>
+                  <p:par>
+                    <p:cTn id="112" fill="hold">
+                      <p:stCondLst>
+                        <p:cond delay="indefinite"/>
+                      </p:stCondLst>
+                      <p:childTnLst>
+                        <p:par>
+                          <p:cTn id="113" fill="hold">
+                            <p:stCondLst>
+                              <p:cond delay="0"/>
+                            </p:stCondLst>
+                            <p:childTnLst>
+                              <p:par>
+                                <p:cTn id="114" presetID="42" presetClass="entr" presetSubtype="0" fill="hold" grpId="0" nodeType="clickEffect">
+                                  <p:stCondLst>
+                                    <p:cond delay="0"/>
+                                  </p:stCondLst>
+                                  <p:childTnLst>
+                                    <p:set>
+                                      <p:cBhvr>
+                                        <p:cTn id="115" dur="1" fill="hold">
+                                          <p:stCondLst>
+                                            <p:cond delay="0"/>
+                                          </p:stCondLst>
+                                        </p:cTn>
+                                        <p:tgtEl>
+                                          <p:spTgt spid="40"/>
+                                        </p:tgtEl>
+                                        <p:attrNameLst>
+                                          <p:attrName>style.visibility</p:attrName>
+                                        </p:attrNameLst>
+                                      </p:cBhvr>
+                                      <p:to>
+                                        <p:strVal val="visible"/>
+                                      </p:to>
+                                    </p:set>
+                                    <p:animEffect transition="in" filter="fade">
+                                      <p:cBhvr>
+                                        <p:cTn id="116" dur="1000"/>
+                                        <p:tgtEl>
+                                          <p:spTgt spid="40"/>
+                                        </p:tgtEl>
+                                      </p:cBhvr>
+                                    </p:animEffect>
+                                    <p:anim calcmode="lin" valueType="num">
+                                      <p:cBhvr>
+                                        <p:cTn id="117" dur="1000" fill="hold"/>
+                                        <p:tgtEl>
+                                          <p:spTgt spid="40"/>
+                                        </p:tgtEl>
+                                        <p:attrNameLst>
+                                          <p:attrName>ppt_x</p:attrName>
+                                        </p:attrNameLst>
+                                      </p:cBhvr>
+                                      <p:tavLst>
+                                        <p:tav tm="0">
+                                          <p:val>
+                                            <p:strVal val="#ppt_x"/>
+                                          </p:val>
+                                        </p:tav>
+                                        <p:tav tm="100000">
+                                          <p:val>
+                                            <p:strVal val="#ppt_x"/>
+                                          </p:val>
+                                        </p:tav>
+                                      </p:tavLst>
+                                    </p:anim>
+                                    <p:anim calcmode="lin" valueType="num">
+                                      <p:cBhvr>
+                                        <p:cTn id="118" dur="1000" fill="hold"/>
+                                        <p:tgtEl>
+                                          <p:spTgt spid="40"/>
+                                        </p:tgtEl>
+                                        <p:attrNameLst>
+                                          <p:attrName>ppt_y</p:attrName>
+                                        </p:attrNameLst>
+                                      </p:cBhvr>
+                                      <p:tavLst>
+                                        <p:tav tm="0">
+                                          <p:val>
+                                            <p:strVal val="#ppt_y+.1"/>
+                                          </p:val>
+                                        </p:tav>
+                                        <p:tav tm="100000">
+                                          <p:val>
+                                            <p:strVal val="#ppt_y"/>
+                                          </p:val>
+                                        </p:tav>
+                                      </p:tavLst>
+                                    </p:anim>
+                                  </p:childTnLst>
+                                </p:cTn>
+                              </p:par>
+                            </p:childTnLst>
+                          </p:cTn>
+                        </p:par>
+                      </p:childTnLst>
+                    </p:cTn>
+                  </p:par>
+                  <p:par>
+                    <p:cTn id="119" fill="hold">
+                      <p:stCondLst>
+                        <p:cond delay="indefinite"/>
+                      </p:stCondLst>
+                      <p:childTnLst>
+                        <p:par>
+                          <p:cTn id="120" fill="hold">
+                            <p:stCondLst>
+                              <p:cond delay="0"/>
+                            </p:stCondLst>
+                            <p:childTnLst>
+                              <p:par>
+                                <p:cTn id="121" presetID="10" presetClass="entr" presetSubtype="0" fill="hold" grpId="0" nodeType="clickEffect">
+                                  <p:stCondLst>
+                                    <p:cond delay="0"/>
+                                  </p:stCondLst>
+                                  <p:childTnLst>
+                                    <p:set>
+                                      <p:cBhvr>
+                                        <p:cTn id="122" dur="1" fill="hold">
+                                          <p:stCondLst>
+                                            <p:cond delay="0"/>
+                                          </p:stCondLst>
+                                        </p:cTn>
+                                        <p:tgtEl>
+                                          <p:spTgt spid="41"/>
+                                        </p:tgtEl>
+                                        <p:attrNameLst>
+                                          <p:attrName>style.visibility</p:attrName>
+                                        </p:attrNameLst>
+                                      </p:cBhvr>
+                                      <p:to>
+                                        <p:strVal val="visible"/>
+                                      </p:to>
+                                    </p:set>
+                                    <p:animEffect transition="in" filter="fade">
+                                      <p:cBhvr>
+                                        <p:cTn id="123" dur="500"/>
+                                        <p:tgtEl>
+                                          <p:spTgt spid="41"/>
+                                        </p:tgtEl>
+                                      </p:cBhvr>
+                                    </p:animEffect>
+                                  </p:childTnLst>
+                                </p:cTn>
+                              </p:par>
+                            </p:childTnLst>
+                          </p:cTn>
+                        </p:par>
+                      </p:childTnLst>
+                    </p:cTn>
+                  </p:par>
+                </p:childTnLst>
+              </p:cTn>
+              <p:prevCondLst>
+                <p:cond evt="onPrev" delay="0">
+                  <p:tgtEl>
+                    <p:sldTgt/>
+                  </p:tgtEl>
+                </p:cond>
+              </p:prevCondLst>
+              <p:nextCondLst>
+                <p:cond evt="onNext" delay="0">
+                  <p:tgtEl>
+                    <p:sldTgt/>
+                  </p:tgtEl>
+                </p:cond>
+              </p:nextCondLst>
+            </p:seq>
+          </p:childTnLst>
+        </p:cTn>
+      </p:par>
+    </p:tnLst>
+    <p:bldLst>
+      <p:bldP spid="8" grpId="0"/>
+      <p:bldP spid="9" grpId="0"/>
+      <p:bldP spid="10" grpId="0"/>
+      <p:bldP spid="11" grpId="0" animBg="1"/>
+      <p:bldP spid="17" grpId="0" animBg="1"/>
+      <p:bldP spid="33" grpId="0"/>
+      <p:bldP spid="34" grpId="0"/>
+      <p:bldP spid="37" grpId="0"/>
+      <p:bldP spid="40" grpId="0"/>
+      <p:bldP spid="41" grpId="0" animBg="1"/>
+      <p:bldP spid="42" grpId="0" animBg="1"/>
+      <p:bldP spid="71" grpId="0" animBg="1"/>
+      <p:bldP spid="43" grpId="0"/>
+      <p:bldP spid="50" grpId="0"/>
+      <p:bldP spid="51" grpId="0"/>
+    </p:bldLst>
+  </p:timing>
 </p:sld>
 </file>
 
@@ -26044,7 +30135,7 @@
             <p:ph idx="1"/>
             <p:extLst>
               <p:ext uri="{D42A27DB-BD31-4B8C-83A1-F6EECF244321}">
-                <p14:modId xmlns:p14="http://schemas.microsoft.com/office/powerpoint/2010/main" val="1956834485"/>
+                <p14:modId xmlns:p14="http://schemas.microsoft.com/office/powerpoint/2010/main" val="75463404"/>
               </p:ext>
             </p:extLst>
           </p:nvPr>
@@ -26069,6 +30160,140 @@
   <p:clrMapOvr>
     <a:masterClrMapping/>
   </p:clrMapOvr>
+  <p:timing>
+    <p:tnLst>
+      <p:par>
+        <p:cTn id="1" dur="indefinite" restart="never" nodeType="tmRoot">
+          <p:childTnLst>
+            <p:seq concurrent="1" nextAc="seek">
+              <p:cTn id="2" dur="indefinite" nodeType="mainSeq">
+                <p:childTnLst>
+                  <p:par>
+                    <p:cTn id="3" fill="hold">
+                      <p:stCondLst>
+                        <p:cond delay="indefinite"/>
+                      </p:stCondLst>
+                      <p:childTnLst>
+                        <p:par>
+                          <p:cTn id="4" fill="hold">
+                            <p:stCondLst>
+                              <p:cond delay="0"/>
+                            </p:stCondLst>
+                            <p:childTnLst>
+                              <p:par>
+                                <p:cTn id="5" presetID="42" presetClass="entr" presetSubtype="0" fill="hold" grpId="0" nodeType="clickEffect">
+                                  <p:stCondLst>
+                                    <p:cond delay="0"/>
+                                  </p:stCondLst>
+                                  <p:childTnLst>
+                                    <p:set>
+                                      <p:cBhvr>
+                                        <p:cTn id="6" dur="1" fill="hold">
+                                          <p:stCondLst>
+                                            <p:cond delay="0"/>
+                                          </p:stCondLst>
+                                        </p:cTn>
+                                        <p:tgtEl>
+                                          <p:spTgt spid="12"/>
+                                        </p:tgtEl>
+                                        <p:attrNameLst>
+                                          <p:attrName>style.visibility</p:attrName>
+                                        </p:attrNameLst>
+                                      </p:cBhvr>
+                                      <p:to>
+                                        <p:strVal val="visible"/>
+                                      </p:to>
+                                    </p:set>
+                                    <p:animEffect transition="in" filter="fade">
+                                      <p:cBhvr>
+                                        <p:cTn id="7" dur="1000"/>
+                                        <p:tgtEl>
+                                          <p:spTgt spid="12"/>
+                                        </p:tgtEl>
+                                      </p:cBhvr>
+                                    </p:animEffect>
+                                    <p:anim calcmode="lin" valueType="num">
+                                      <p:cBhvr>
+                                        <p:cTn id="8" dur="1000" fill="hold"/>
+                                        <p:tgtEl>
+                                          <p:spTgt spid="12"/>
+                                        </p:tgtEl>
+                                        <p:attrNameLst>
+                                          <p:attrName>ppt_x</p:attrName>
+                                        </p:attrNameLst>
+                                      </p:cBhvr>
+                                      <p:tavLst>
+                                        <p:tav tm="0">
+                                          <p:val>
+                                            <p:strVal val="#ppt_x"/>
+                                          </p:val>
+                                        </p:tav>
+                                        <p:tav tm="100000">
+                                          <p:val>
+                                            <p:strVal val="#ppt_x"/>
+                                          </p:val>
+                                        </p:tav>
+                                      </p:tavLst>
+                                    </p:anim>
+                                    <p:anim calcmode="lin" valueType="num">
+                                      <p:cBhvr>
+                                        <p:cTn id="9" dur="1000" fill="hold"/>
+                                        <p:tgtEl>
+                                          <p:spTgt spid="12"/>
+                                        </p:tgtEl>
+                                        <p:attrNameLst>
+                                          <p:attrName>ppt_y</p:attrName>
+                                        </p:attrNameLst>
+                                      </p:cBhvr>
+                                      <p:tavLst>
+                                        <p:tav tm="0">
+                                          <p:val>
+                                            <p:strVal val="#ppt_y+.1"/>
+                                          </p:val>
+                                        </p:tav>
+                                        <p:tav tm="100000">
+                                          <p:val>
+                                            <p:strVal val="#ppt_y"/>
+                                          </p:val>
+                                        </p:tav>
+                                      </p:tavLst>
+                                    </p:anim>
+                                  </p:childTnLst>
+                                </p:cTn>
+                              </p:par>
+                            </p:childTnLst>
+                          </p:cTn>
+                        </p:par>
+                      </p:childTnLst>
+                    </p:cTn>
+                  </p:par>
+                </p:childTnLst>
+              </p:cTn>
+              <p:prevCondLst>
+                <p:cond evt="onPrev" delay="0">
+                  <p:tgtEl>
+                    <p:sldTgt/>
+                  </p:tgtEl>
+                </p:cond>
+              </p:prevCondLst>
+              <p:nextCondLst>
+                <p:cond evt="onNext" delay="0">
+                  <p:tgtEl>
+                    <p:sldTgt/>
+                  </p:tgtEl>
+                </p:cond>
+              </p:nextCondLst>
+            </p:seq>
+          </p:childTnLst>
+        </p:cTn>
+      </p:par>
+    </p:tnLst>
+    <p:bldLst>
+      <p:bldGraphic spid="12" grpId="0">
+        <p:bldAsOne/>
+      </p:bldGraphic>
+    </p:bldLst>
+  </p:timing>
 </p:sld>
 </file>
 

</xml_diff>